<commit_message>
Fix: Changed PPTX to correspond to current project state
</commit_message>
<xml_diff>
--- a/MATF_primer_prezentacije.pptx
+++ b/MATF_primer_prezentacije.pptx
@@ -243,7 +243,7 @@
           <a:p>
             <a:fld id="{4E7DCCD2-73FF-455C-9FA4-F1BB14D3D543}" type="datetimeFigureOut">
               <a:rPr lang="en-US" smtClean="0"/>
-              <a:t>12/20/2020</a:t>
+              <a:t>12/26/2020</a:t>
             </a:fld>
             <a:endParaRPr lang="en-US"/>
           </a:p>
@@ -617,7 +617,7 @@
           <p:cNvPr id="10" name="Picture 9" descr="A picture containing sign, stop, reading, outdoor&#10;&#10;Description automatically generated">
             <a:extLst>
               <a:ext uri="{FF2B5EF4-FFF2-40B4-BE49-F238E27FC236}">
-                <a16:creationId xmlns="" xmlns:a16="http://schemas.microsoft.com/office/drawing/2014/main" id="{DF1028B7-C475-B942-BB87-B079E02CE2CD}"/>
+                <a16:creationId xmlns:a16="http://schemas.microsoft.com/office/drawing/2014/main" xmlns="" id="{DF1028B7-C475-B942-BB87-B079E02CE2CD}"/>
               </a:ext>
             </a:extLst>
           </p:cNvPr>
@@ -646,7 +646,7 @@
           <p:cNvPr id="2" name="Title 1">
             <a:extLst>
               <a:ext uri="{FF2B5EF4-FFF2-40B4-BE49-F238E27FC236}">
-                <a16:creationId xmlns="" xmlns:a16="http://schemas.microsoft.com/office/drawing/2014/main" id="{954EDC8C-7EA9-6744-A4AF-FA428FB4F7F3}"/>
+                <a16:creationId xmlns:a16="http://schemas.microsoft.com/office/drawing/2014/main" xmlns="" id="{954EDC8C-7EA9-6744-A4AF-FA428FB4F7F3}"/>
               </a:ext>
             </a:extLst>
           </p:cNvPr>
@@ -684,7 +684,7 @@
           <p:cNvPr id="3" name="Subtitle 2">
             <a:extLst>
               <a:ext uri="{FF2B5EF4-FFF2-40B4-BE49-F238E27FC236}">
-                <a16:creationId xmlns="" xmlns:a16="http://schemas.microsoft.com/office/drawing/2014/main" id="{23211E7F-CBB1-B54B-88FF-1DD5848C53B4}"/>
+                <a16:creationId xmlns:a16="http://schemas.microsoft.com/office/drawing/2014/main" xmlns="" id="{23211E7F-CBB1-B54B-88FF-1DD5848C53B4}"/>
               </a:ext>
             </a:extLst>
           </p:cNvPr>
@@ -755,7 +755,7 @@
           <p:cNvPr id="4" name="Date Placeholder 3">
             <a:extLst>
               <a:ext uri="{FF2B5EF4-FFF2-40B4-BE49-F238E27FC236}">
-                <a16:creationId xmlns="" xmlns:a16="http://schemas.microsoft.com/office/drawing/2014/main" id="{56F9E447-7CCF-2E4C-B7B9-CBFAA3375360}"/>
+                <a16:creationId xmlns:a16="http://schemas.microsoft.com/office/drawing/2014/main" xmlns="" id="{56F9E447-7CCF-2E4C-B7B9-CBFAA3375360}"/>
               </a:ext>
             </a:extLst>
           </p:cNvPr>
@@ -774,7 +774,7 @@
             <a:fld id="{A3D8ACCB-D86A-8340-83DF-E9D64A929EB3}" type="datetimeFigureOut">
               <a:rPr lang="x-none" smtClean="0"/>
               <a:pPr/>
-              <a:t>12/20/2020</a:t>
+              <a:t>12/26/2020</a:t>
             </a:fld>
             <a:endParaRPr lang="x-none"/>
           </a:p>
@@ -785,7 +785,7 @@
           <p:cNvPr id="5" name="Footer Placeholder 4">
             <a:extLst>
               <a:ext uri="{FF2B5EF4-FFF2-40B4-BE49-F238E27FC236}">
-                <a16:creationId xmlns="" xmlns:a16="http://schemas.microsoft.com/office/drawing/2014/main" id="{CD181218-32FA-D44B-9434-7BA705E19B3D}"/>
+                <a16:creationId xmlns:a16="http://schemas.microsoft.com/office/drawing/2014/main" xmlns="" id="{CD181218-32FA-D44B-9434-7BA705E19B3D}"/>
               </a:ext>
             </a:extLst>
           </p:cNvPr>
@@ -810,7 +810,7 @@
           <p:cNvPr id="6" name="Slide Number Placeholder 5">
             <a:extLst>
               <a:ext uri="{FF2B5EF4-FFF2-40B4-BE49-F238E27FC236}">
-                <a16:creationId xmlns="" xmlns:a16="http://schemas.microsoft.com/office/drawing/2014/main" id="{544BDFBD-F2DF-4C42-9B96-F460581EFFB7}"/>
+                <a16:creationId xmlns:a16="http://schemas.microsoft.com/office/drawing/2014/main" xmlns="" id="{544BDFBD-F2DF-4C42-9B96-F460581EFFB7}"/>
               </a:ext>
             </a:extLst>
           </p:cNvPr>
@@ -840,7 +840,7 @@
           <p:cNvPr id="12" name="Picture 11" descr="A close up of a logo&#10;&#10;Description automatically generated">
             <a:extLst>
               <a:ext uri="{FF2B5EF4-FFF2-40B4-BE49-F238E27FC236}">
-                <a16:creationId xmlns="" xmlns:a16="http://schemas.microsoft.com/office/drawing/2014/main" id="{2578900A-EE75-EC4B-93EF-FBF256D8A1E2}"/>
+                <a16:creationId xmlns:a16="http://schemas.microsoft.com/office/drawing/2014/main" xmlns="" id="{2578900A-EE75-EC4B-93EF-FBF256D8A1E2}"/>
               </a:ext>
             </a:extLst>
           </p:cNvPr>
@@ -899,7 +899,7 @@
           <p:cNvPr id="7" name="Picture 6" descr="A picture containing sign, stop, reading, outdoor&#10;&#10;Description automatically generated">
             <a:extLst>
               <a:ext uri="{FF2B5EF4-FFF2-40B4-BE49-F238E27FC236}">
-                <a16:creationId xmlns="" xmlns:a16="http://schemas.microsoft.com/office/drawing/2014/main" id="{4D3097C3-2C20-6840-9001-A5EF7822FFB8}"/>
+                <a16:creationId xmlns:a16="http://schemas.microsoft.com/office/drawing/2014/main" xmlns="" id="{4D3097C3-2C20-6840-9001-A5EF7822FFB8}"/>
               </a:ext>
             </a:extLst>
           </p:cNvPr>
@@ -928,7 +928,7 @@
           <p:cNvPr id="2" name="Title 1">
             <a:extLst>
               <a:ext uri="{FF2B5EF4-FFF2-40B4-BE49-F238E27FC236}">
-                <a16:creationId xmlns="" xmlns:a16="http://schemas.microsoft.com/office/drawing/2014/main" id="{6F0D10E3-C8D0-EC4A-BE87-BFB70C631F98}"/>
+                <a16:creationId xmlns:a16="http://schemas.microsoft.com/office/drawing/2014/main" xmlns="" id="{6F0D10E3-C8D0-EC4A-BE87-BFB70C631F98}"/>
               </a:ext>
             </a:extLst>
           </p:cNvPr>
@@ -962,7 +962,7 @@
           <p:cNvPr id="3" name="Vertical Text Placeholder 2">
             <a:extLst>
               <a:ext uri="{FF2B5EF4-FFF2-40B4-BE49-F238E27FC236}">
-                <a16:creationId xmlns="" xmlns:a16="http://schemas.microsoft.com/office/drawing/2014/main" id="{91919FAE-BC5C-B140-9361-B70FBB7FBB4B}"/>
+                <a16:creationId xmlns:a16="http://schemas.microsoft.com/office/drawing/2014/main" xmlns="" id="{91919FAE-BC5C-B140-9361-B70FBB7FBB4B}"/>
               </a:ext>
             </a:extLst>
           </p:cNvPr>
@@ -1020,7 +1020,7 @@
           <p:cNvPr id="4" name="Date Placeholder 3">
             <a:extLst>
               <a:ext uri="{FF2B5EF4-FFF2-40B4-BE49-F238E27FC236}">
-                <a16:creationId xmlns="" xmlns:a16="http://schemas.microsoft.com/office/drawing/2014/main" id="{91454B07-7987-384A-B6BC-F86B989B2E10}"/>
+                <a16:creationId xmlns:a16="http://schemas.microsoft.com/office/drawing/2014/main" xmlns="" id="{91454B07-7987-384A-B6BC-F86B989B2E10}"/>
               </a:ext>
             </a:extLst>
           </p:cNvPr>
@@ -1039,7 +1039,7 @@
             <a:fld id="{A3D8ACCB-D86A-8340-83DF-E9D64A929EB3}" type="datetimeFigureOut">
               <a:rPr lang="x-none" smtClean="0"/>
               <a:pPr/>
-              <a:t>12/20/2020</a:t>
+              <a:t>12/26/2020</a:t>
             </a:fld>
             <a:endParaRPr lang="x-none"/>
           </a:p>
@@ -1050,7 +1050,7 @@
           <p:cNvPr id="5" name="Footer Placeholder 4">
             <a:extLst>
               <a:ext uri="{FF2B5EF4-FFF2-40B4-BE49-F238E27FC236}">
-                <a16:creationId xmlns="" xmlns:a16="http://schemas.microsoft.com/office/drawing/2014/main" id="{39D0DD5C-5397-2A40-954E-291C5AF81AEF}"/>
+                <a16:creationId xmlns:a16="http://schemas.microsoft.com/office/drawing/2014/main" xmlns="" id="{39D0DD5C-5397-2A40-954E-291C5AF81AEF}"/>
               </a:ext>
             </a:extLst>
           </p:cNvPr>
@@ -1075,7 +1075,7 @@
           <p:cNvPr id="6" name="Slide Number Placeholder 5">
             <a:extLst>
               <a:ext uri="{FF2B5EF4-FFF2-40B4-BE49-F238E27FC236}">
-                <a16:creationId xmlns="" xmlns:a16="http://schemas.microsoft.com/office/drawing/2014/main" id="{B64A847F-4920-064B-A87B-3E4CE6A4B6BC}"/>
+                <a16:creationId xmlns:a16="http://schemas.microsoft.com/office/drawing/2014/main" xmlns="" id="{B64A847F-4920-064B-A87B-3E4CE6A4B6BC}"/>
               </a:ext>
             </a:extLst>
           </p:cNvPr>
@@ -1135,7 +1135,7 @@
           <p:cNvPr id="7" name="Picture 6" descr="A picture containing sign, stop, reading, outdoor&#10;&#10;Description automatically generated">
             <a:extLst>
               <a:ext uri="{FF2B5EF4-FFF2-40B4-BE49-F238E27FC236}">
-                <a16:creationId xmlns="" xmlns:a16="http://schemas.microsoft.com/office/drawing/2014/main" id="{A87775D8-2853-A645-A287-5B01F70B880C}"/>
+                <a16:creationId xmlns:a16="http://schemas.microsoft.com/office/drawing/2014/main" xmlns="" id="{A87775D8-2853-A645-A287-5B01F70B880C}"/>
               </a:ext>
             </a:extLst>
           </p:cNvPr>
@@ -1164,7 +1164,7 @@
           <p:cNvPr id="2" name="Vertical Title 1">
             <a:extLst>
               <a:ext uri="{FF2B5EF4-FFF2-40B4-BE49-F238E27FC236}">
-                <a16:creationId xmlns="" xmlns:a16="http://schemas.microsoft.com/office/drawing/2014/main" id="{90304A83-3320-1846-ADE1-55E81DF04DD2}"/>
+                <a16:creationId xmlns:a16="http://schemas.microsoft.com/office/drawing/2014/main" xmlns="" id="{90304A83-3320-1846-ADE1-55E81DF04DD2}"/>
               </a:ext>
             </a:extLst>
           </p:cNvPr>
@@ -1198,7 +1198,7 @@
           <p:cNvPr id="3" name="Vertical Text Placeholder 2">
             <a:extLst>
               <a:ext uri="{FF2B5EF4-FFF2-40B4-BE49-F238E27FC236}">
-                <a16:creationId xmlns="" xmlns:a16="http://schemas.microsoft.com/office/drawing/2014/main" id="{55A2525D-6D44-2F49-BFAA-82866B804F9E}"/>
+                <a16:creationId xmlns:a16="http://schemas.microsoft.com/office/drawing/2014/main" xmlns="" id="{55A2525D-6D44-2F49-BFAA-82866B804F9E}"/>
               </a:ext>
             </a:extLst>
           </p:cNvPr>
@@ -1261,7 +1261,7 @@
           <p:cNvPr id="4" name="Date Placeholder 3">
             <a:extLst>
               <a:ext uri="{FF2B5EF4-FFF2-40B4-BE49-F238E27FC236}">
-                <a16:creationId xmlns="" xmlns:a16="http://schemas.microsoft.com/office/drawing/2014/main" id="{1E4F98B7-5D63-7D42-896E-3A5C4479B674}"/>
+                <a16:creationId xmlns:a16="http://schemas.microsoft.com/office/drawing/2014/main" xmlns="" id="{1E4F98B7-5D63-7D42-896E-3A5C4479B674}"/>
               </a:ext>
             </a:extLst>
           </p:cNvPr>
@@ -1280,7 +1280,7 @@
             <a:fld id="{A3D8ACCB-D86A-8340-83DF-E9D64A929EB3}" type="datetimeFigureOut">
               <a:rPr lang="x-none" smtClean="0"/>
               <a:pPr/>
-              <a:t>12/20/2020</a:t>
+              <a:t>12/26/2020</a:t>
             </a:fld>
             <a:endParaRPr lang="x-none"/>
           </a:p>
@@ -1291,7 +1291,7 @@
           <p:cNvPr id="5" name="Footer Placeholder 4">
             <a:extLst>
               <a:ext uri="{FF2B5EF4-FFF2-40B4-BE49-F238E27FC236}">
-                <a16:creationId xmlns="" xmlns:a16="http://schemas.microsoft.com/office/drawing/2014/main" id="{72FA722D-E4F6-C54B-B383-1DA0CFF2BDAF}"/>
+                <a16:creationId xmlns:a16="http://schemas.microsoft.com/office/drawing/2014/main" xmlns="" id="{72FA722D-E4F6-C54B-B383-1DA0CFF2BDAF}"/>
               </a:ext>
             </a:extLst>
           </p:cNvPr>
@@ -1316,7 +1316,7 @@
           <p:cNvPr id="6" name="Slide Number Placeholder 5">
             <a:extLst>
               <a:ext uri="{FF2B5EF4-FFF2-40B4-BE49-F238E27FC236}">
-                <a16:creationId xmlns="" xmlns:a16="http://schemas.microsoft.com/office/drawing/2014/main" id="{832B92FF-D5B5-0847-803A-6E512488BED0}"/>
+                <a16:creationId xmlns:a16="http://schemas.microsoft.com/office/drawing/2014/main" xmlns="" id="{832B92FF-D5B5-0847-803A-6E512488BED0}"/>
               </a:ext>
             </a:extLst>
           </p:cNvPr>
@@ -1376,7 +1376,7 @@
           <p:cNvPr id="7" name="Picture 6" descr="A picture containing sign, stop, reading, outdoor&#10;&#10;Description automatically generated">
             <a:extLst>
               <a:ext uri="{FF2B5EF4-FFF2-40B4-BE49-F238E27FC236}">
-                <a16:creationId xmlns="" xmlns:a16="http://schemas.microsoft.com/office/drawing/2014/main" id="{E9BB3A8C-6B66-0F4C-917B-DE77ED193F51}"/>
+                <a16:creationId xmlns:a16="http://schemas.microsoft.com/office/drawing/2014/main" xmlns="" id="{E9BB3A8C-6B66-0F4C-917B-DE77ED193F51}"/>
               </a:ext>
             </a:extLst>
           </p:cNvPr>
@@ -1405,7 +1405,7 @@
           <p:cNvPr id="2" name="Title 1">
             <a:extLst>
               <a:ext uri="{FF2B5EF4-FFF2-40B4-BE49-F238E27FC236}">
-                <a16:creationId xmlns="" xmlns:a16="http://schemas.microsoft.com/office/drawing/2014/main" id="{F46AFC78-2AF9-224D-9A80-BFC329A107FB}"/>
+                <a16:creationId xmlns:a16="http://schemas.microsoft.com/office/drawing/2014/main" xmlns="" id="{F46AFC78-2AF9-224D-9A80-BFC329A107FB}"/>
               </a:ext>
             </a:extLst>
           </p:cNvPr>
@@ -1439,7 +1439,7 @@
           <p:cNvPr id="3" name="Content Placeholder 2">
             <a:extLst>
               <a:ext uri="{FF2B5EF4-FFF2-40B4-BE49-F238E27FC236}">
-                <a16:creationId xmlns="" xmlns:a16="http://schemas.microsoft.com/office/drawing/2014/main" id="{FC259A79-4C18-864D-AE36-E0E13173AD91}"/>
+                <a16:creationId xmlns:a16="http://schemas.microsoft.com/office/drawing/2014/main" xmlns="" id="{FC259A79-4C18-864D-AE36-E0E13173AD91}"/>
               </a:ext>
             </a:extLst>
           </p:cNvPr>
@@ -1502,7 +1502,7 @@
           <p:cNvPr id="4" name="Date Placeholder 3">
             <a:extLst>
               <a:ext uri="{FF2B5EF4-FFF2-40B4-BE49-F238E27FC236}">
-                <a16:creationId xmlns="" xmlns:a16="http://schemas.microsoft.com/office/drawing/2014/main" id="{C3C66909-CF21-1441-8A43-11A73AA3EF25}"/>
+                <a16:creationId xmlns:a16="http://schemas.microsoft.com/office/drawing/2014/main" xmlns="" id="{C3C66909-CF21-1441-8A43-11A73AA3EF25}"/>
               </a:ext>
             </a:extLst>
           </p:cNvPr>
@@ -1521,7 +1521,7 @@
             <a:fld id="{A3D8ACCB-D86A-8340-83DF-E9D64A929EB3}" type="datetimeFigureOut">
               <a:rPr lang="x-none" smtClean="0"/>
               <a:pPr/>
-              <a:t>12/20/2020</a:t>
+              <a:t>12/26/2020</a:t>
             </a:fld>
             <a:endParaRPr lang="x-none"/>
           </a:p>
@@ -1532,7 +1532,7 @@
           <p:cNvPr id="5" name="Footer Placeholder 4">
             <a:extLst>
               <a:ext uri="{FF2B5EF4-FFF2-40B4-BE49-F238E27FC236}">
-                <a16:creationId xmlns="" xmlns:a16="http://schemas.microsoft.com/office/drawing/2014/main" id="{A57EF567-C04D-9C47-99E9-85EE3FBA12CB}"/>
+                <a16:creationId xmlns:a16="http://schemas.microsoft.com/office/drawing/2014/main" xmlns="" id="{A57EF567-C04D-9C47-99E9-85EE3FBA12CB}"/>
               </a:ext>
             </a:extLst>
           </p:cNvPr>
@@ -1557,7 +1557,7 @@
           <p:cNvPr id="6" name="Slide Number Placeholder 5">
             <a:extLst>
               <a:ext uri="{FF2B5EF4-FFF2-40B4-BE49-F238E27FC236}">
-                <a16:creationId xmlns="" xmlns:a16="http://schemas.microsoft.com/office/drawing/2014/main" id="{411BB96D-4813-A649-9EC8-15E2456D3C5E}"/>
+                <a16:creationId xmlns:a16="http://schemas.microsoft.com/office/drawing/2014/main" xmlns="" id="{411BB96D-4813-A649-9EC8-15E2456D3C5E}"/>
               </a:ext>
             </a:extLst>
           </p:cNvPr>
@@ -1617,7 +1617,7 @@
           <p:cNvPr id="7" name="Picture 6" descr="A picture containing sign, stop, reading, outdoor&#10;&#10;Description automatically generated">
             <a:extLst>
               <a:ext uri="{FF2B5EF4-FFF2-40B4-BE49-F238E27FC236}">
-                <a16:creationId xmlns="" xmlns:a16="http://schemas.microsoft.com/office/drawing/2014/main" id="{5CB5D82F-07DC-8A4F-BAF0-92406E878C3F}"/>
+                <a16:creationId xmlns:a16="http://schemas.microsoft.com/office/drawing/2014/main" xmlns="" id="{5CB5D82F-07DC-8A4F-BAF0-92406E878C3F}"/>
               </a:ext>
             </a:extLst>
           </p:cNvPr>
@@ -1646,7 +1646,7 @@
           <p:cNvPr id="2" name="Title 1">
             <a:extLst>
               <a:ext uri="{FF2B5EF4-FFF2-40B4-BE49-F238E27FC236}">
-                <a16:creationId xmlns="" xmlns:a16="http://schemas.microsoft.com/office/drawing/2014/main" id="{CA8502F9-0CD3-5545-BECD-7099F196073C}"/>
+                <a16:creationId xmlns:a16="http://schemas.microsoft.com/office/drawing/2014/main" xmlns="" id="{CA8502F9-0CD3-5545-BECD-7099F196073C}"/>
               </a:ext>
             </a:extLst>
           </p:cNvPr>
@@ -1684,7 +1684,7 @@
           <p:cNvPr id="3" name="Text Placeholder 2">
             <a:extLst>
               <a:ext uri="{FF2B5EF4-FFF2-40B4-BE49-F238E27FC236}">
-                <a16:creationId xmlns="" xmlns:a16="http://schemas.microsoft.com/office/drawing/2014/main" id="{277FD5D6-D817-F542-A588-5CE3B63483BF}"/>
+                <a16:creationId xmlns:a16="http://schemas.microsoft.com/office/drawing/2014/main" xmlns="" id="{277FD5D6-D817-F542-A588-5CE3B63483BF}"/>
               </a:ext>
             </a:extLst>
           </p:cNvPr>
@@ -1809,7 +1809,7 @@
           <p:cNvPr id="4" name="Date Placeholder 3">
             <a:extLst>
               <a:ext uri="{FF2B5EF4-FFF2-40B4-BE49-F238E27FC236}">
-                <a16:creationId xmlns="" xmlns:a16="http://schemas.microsoft.com/office/drawing/2014/main" id="{4889D331-6F5F-FE4F-BACE-36335DF6F55D}"/>
+                <a16:creationId xmlns:a16="http://schemas.microsoft.com/office/drawing/2014/main" xmlns="" id="{4889D331-6F5F-FE4F-BACE-36335DF6F55D}"/>
               </a:ext>
             </a:extLst>
           </p:cNvPr>
@@ -1828,7 +1828,7 @@
             <a:fld id="{A3D8ACCB-D86A-8340-83DF-E9D64A929EB3}" type="datetimeFigureOut">
               <a:rPr lang="x-none" smtClean="0"/>
               <a:pPr/>
-              <a:t>12/20/2020</a:t>
+              <a:t>12/26/2020</a:t>
             </a:fld>
             <a:endParaRPr lang="x-none"/>
           </a:p>
@@ -1839,7 +1839,7 @@
           <p:cNvPr id="5" name="Footer Placeholder 4">
             <a:extLst>
               <a:ext uri="{FF2B5EF4-FFF2-40B4-BE49-F238E27FC236}">
-                <a16:creationId xmlns="" xmlns:a16="http://schemas.microsoft.com/office/drawing/2014/main" id="{8F0058D6-D68B-5343-958B-81099AD3B0BB}"/>
+                <a16:creationId xmlns:a16="http://schemas.microsoft.com/office/drawing/2014/main" xmlns="" id="{8F0058D6-D68B-5343-958B-81099AD3B0BB}"/>
               </a:ext>
             </a:extLst>
           </p:cNvPr>
@@ -1864,7 +1864,7 @@
           <p:cNvPr id="6" name="Slide Number Placeholder 5">
             <a:extLst>
               <a:ext uri="{FF2B5EF4-FFF2-40B4-BE49-F238E27FC236}">
-                <a16:creationId xmlns="" xmlns:a16="http://schemas.microsoft.com/office/drawing/2014/main" id="{A2841510-5997-3445-A315-F54A64A24AAA}"/>
+                <a16:creationId xmlns:a16="http://schemas.microsoft.com/office/drawing/2014/main" xmlns="" id="{A2841510-5997-3445-A315-F54A64A24AAA}"/>
               </a:ext>
             </a:extLst>
           </p:cNvPr>
@@ -1924,7 +1924,7 @@
           <p:cNvPr id="8" name="Picture 7" descr="A picture containing sign, stop, reading, outdoor&#10;&#10;Description automatically generated">
             <a:extLst>
               <a:ext uri="{FF2B5EF4-FFF2-40B4-BE49-F238E27FC236}">
-                <a16:creationId xmlns="" xmlns:a16="http://schemas.microsoft.com/office/drawing/2014/main" id="{3D958E1B-8148-084E-9A4E-6C5732A18F49}"/>
+                <a16:creationId xmlns:a16="http://schemas.microsoft.com/office/drawing/2014/main" xmlns="" id="{3D958E1B-8148-084E-9A4E-6C5732A18F49}"/>
               </a:ext>
             </a:extLst>
           </p:cNvPr>
@@ -1953,7 +1953,7 @@
           <p:cNvPr id="2" name="Title 1">
             <a:extLst>
               <a:ext uri="{FF2B5EF4-FFF2-40B4-BE49-F238E27FC236}">
-                <a16:creationId xmlns="" xmlns:a16="http://schemas.microsoft.com/office/drawing/2014/main" id="{A7DEE668-B0C6-6449-BD9B-21291EC0F225}"/>
+                <a16:creationId xmlns:a16="http://schemas.microsoft.com/office/drawing/2014/main" xmlns="" id="{A7DEE668-B0C6-6449-BD9B-21291EC0F225}"/>
               </a:ext>
             </a:extLst>
           </p:cNvPr>
@@ -1987,7 +1987,7 @@
           <p:cNvPr id="3" name="Content Placeholder 2">
             <a:extLst>
               <a:ext uri="{FF2B5EF4-FFF2-40B4-BE49-F238E27FC236}">
-                <a16:creationId xmlns="" xmlns:a16="http://schemas.microsoft.com/office/drawing/2014/main" id="{7587F78E-3A83-1E41-BEF0-AB85531DAA41}"/>
+                <a16:creationId xmlns:a16="http://schemas.microsoft.com/office/drawing/2014/main" xmlns="" id="{7587F78E-3A83-1E41-BEF0-AB85531DAA41}"/>
               </a:ext>
             </a:extLst>
           </p:cNvPr>
@@ -2050,7 +2050,7 @@
           <p:cNvPr id="4" name="Content Placeholder 3">
             <a:extLst>
               <a:ext uri="{FF2B5EF4-FFF2-40B4-BE49-F238E27FC236}">
-                <a16:creationId xmlns="" xmlns:a16="http://schemas.microsoft.com/office/drawing/2014/main" id="{9366F0EF-0B24-1646-9858-6EB76705BEE4}"/>
+                <a16:creationId xmlns:a16="http://schemas.microsoft.com/office/drawing/2014/main" xmlns="" id="{9366F0EF-0B24-1646-9858-6EB76705BEE4}"/>
               </a:ext>
             </a:extLst>
           </p:cNvPr>
@@ -2113,7 +2113,7 @@
           <p:cNvPr id="5" name="Date Placeholder 4">
             <a:extLst>
               <a:ext uri="{FF2B5EF4-FFF2-40B4-BE49-F238E27FC236}">
-                <a16:creationId xmlns="" xmlns:a16="http://schemas.microsoft.com/office/drawing/2014/main" id="{778859EE-58B6-6D45-B5ED-FD081ACDAA6C}"/>
+                <a16:creationId xmlns:a16="http://schemas.microsoft.com/office/drawing/2014/main" xmlns="" id="{778859EE-58B6-6D45-B5ED-FD081ACDAA6C}"/>
               </a:ext>
             </a:extLst>
           </p:cNvPr>
@@ -2132,7 +2132,7 @@
             <a:fld id="{A3D8ACCB-D86A-8340-83DF-E9D64A929EB3}" type="datetimeFigureOut">
               <a:rPr lang="x-none" smtClean="0"/>
               <a:pPr/>
-              <a:t>12/20/2020</a:t>
+              <a:t>12/26/2020</a:t>
             </a:fld>
             <a:endParaRPr lang="x-none"/>
           </a:p>
@@ -2143,7 +2143,7 @@
           <p:cNvPr id="6" name="Footer Placeholder 5">
             <a:extLst>
               <a:ext uri="{FF2B5EF4-FFF2-40B4-BE49-F238E27FC236}">
-                <a16:creationId xmlns="" xmlns:a16="http://schemas.microsoft.com/office/drawing/2014/main" id="{A30ED664-762D-6146-A15C-64AF35A9C86B}"/>
+                <a16:creationId xmlns:a16="http://schemas.microsoft.com/office/drawing/2014/main" xmlns="" id="{A30ED664-762D-6146-A15C-64AF35A9C86B}"/>
               </a:ext>
             </a:extLst>
           </p:cNvPr>
@@ -2168,7 +2168,7 @@
           <p:cNvPr id="7" name="Slide Number Placeholder 6">
             <a:extLst>
               <a:ext uri="{FF2B5EF4-FFF2-40B4-BE49-F238E27FC236}">
-                <a16:creationId xmlns="" xmlns:a16="http://schemas.microsoft.com/office/drawing/2014/main" id="{89277735-7EAD-8849-BC11-1A51F3A00A52}"/>
+                <a16:creationId xmlns:a16="http://schemas.microsoft.com/office/drawing/2014/main" xmlns="" id="{89277735-7EAD-8849-BC11-1A51F3A00A52}"/>
               </a:ext>
             </a:extLst>
           </p:cNvPr>
@@ -2228,7 +2228,7 @@
           <p:cNvPr id="10" name="Picture 9" descr="A picture containing sign, stop, reading, outdoor&#10;&#10;Description automatically generated">
             <a:extLst>
               <a:ext uri="{FF2B5EF4-FFF2-40B4-BE49-F238E27FC236}">
-                <a16:creationId xmlns="" xmlns:a16="http://schemas.microsoft.com/office/drawing/2014/main" id="{C7BC9146-4E4F-9E40-A9E9-167FCBCFA884}"/>
+                <a16:creationId xmlns:a16="http://schemas.microsoft.com/office/drawing/2014/main" xmlns="" id="{C7BC9146-4E4F-9E40-A9E9-167FCBCFA884}"/>
               </a:ext>
             </a:extLst>
           </p:cNvPr>
@@ -2257,7 +2257,7 @@
           <p:cNvPr id="2" name="Title 1">
             <a:extLst>
               <a:ext uri="{FF2B5EF4-FFF2-40B4-BE49-F238E27FC236}">
-                <a16:creationId xmlns="" xmlns:a16="http://schemas.microsoft.com/office/drawing/2014/main" id="{01211D31-E6AD-9941-AD2A-E6EBA88452FB}"/>
+                <a16:creationId xmlns:a16="http://schemas.microsoft.com/office/drawing/2014/main" xmlns="" id="{01211D31-E6AD-9941-AD2A-E6EBA88452FB}"/>
               </a:ext>
             </a:extLst>
           </p:cNvPr>
@@ -2291,7 +2291,7 @@
           <p:cNvPr id="3" name="Text Placeholder 2">
             <a:extLst>
               <a:ext uri="{FF2B5EF4-FFF2-40B4-BE49-F238E27FC236}">
-                <a16:creationId xmlns="" xmlns:a16="http://schemas.microsoft.com/office/drawing/2014/main" id="{3271B633-D186-4A46-889F-9366656454CC}"/>
+                <a16:creationId xmlns:a16="http://schemas.microsoft.com/office/drawing/2014/main" xmlns="" id="{3271B633-D186-4A46-889F-9366656454CC}"/>
               </a:ext>
             </a:extLst>
           </p:cNvPr>
@@ -2362,7 +2362,7 @@
           <p:cNvPr id="4" name="Content Placeholder 3">
             <a:extLst>
               <a:ext uri="{FF2B5EF4-FFF2-40B4-BE49-F238E27FC236}">
-                <a16:creationId xmlns="" xmlns:a16="http://schemas.microsoft.com/office/drawing/2014/main" id="{42011160-787B-4C45-8EA3-D5E9F5276FCA}"/>
+                <a16:creationId xmlns:a16="http://schemas.microsoft.com/office/drawing/2014/main" xmlns="" id="{42011160-787B-4C45-8EA3-D5E9F5276FCA}"/>
               </a:ext>
             </a:extLst>
           </p:cNvPr>
@@ -2425,7 +2425,7 @@
           <p:cNvPr id="5" name="Text Placeholder 4">
             <a:extLst>
               <a:ext uri="{FF2B5EF4-FFF2-40B4-BE49-F238E27FC236}">
-                <a16:creationId xmlns="" xmlns:a16="http://schemas.microsoft.com/office/drawing/2014/main" id="{B243C6E0-42E7-D34A-950E-9B5ABA7A17CC}"/>
+                <a16:creationId xmlns:a16="http://schemas.microsoft.com/office/drawing/2014/main" xmlns="" id="{B243C6E0-42E7-D34A-950E-9B5ABA7A17CC}"/>
               </a:ext>
             </a:extLst>
           </p:cNvPr>
@@ -2496,7 +2496,7 @@
           <p:cNvPr id="6" name="Content Placeholder 5">
             <a:extLst>
               <a:ext uri="{FF2B5EF4-FFF2-40B4-BE49-F238E27FC236}">
-                <a16:creationId xmlns="" xmlns:a16="http://schemas.microsoft.com/office/drawing/2014/main" id="{9EC37BD9-2970-F74B-8C68-BD726BAA8C04}"/>
+                <a16:creationId xmlns:a16="http://schemas.microsoft.com/office/drawing/2014/main" xmlns="" id="{9EC37BD9-2970-F74B-8C68-BD726BAA8C04}"/>
               </a:ext>
             </a:extLst>
           </p:cNvPr>
@@ -2559,7 +2559,7 @@
           <p:cNvPr id="7" name="Date Placeholder 6">
             <a:extLst>
               <a:ext uri="{FF2B5EF4-FFF2-40B4-BE49-F238E27FC236}">
-                <a16:creationId xmlns="" xmlns:a16="http://schemas.microsoft.com/office/drawing/2014/main" id="{8EE4512D-4858-5249-BCD2-4210F4C13AC5}"/>
+                <a16:creationId xmlns:a16="http://schemas.microsoft.com/office/drawing/2014/main" xmlns="" id="{8EE4512D-4858-5249-BCD2-4210F4C13AC5}"/>
               </a:ext>
             </a:extLst>
           </p:cNvPr>
@@ -2578,7 +2578,7 @@
             <a:fld id="{A3D8ACCB-D86A-8340-83DF-E9D64A929EB3}" type="datetimeFigureOut">
               <a:rPr lang="x-none" smtClean="0"/>
               <a:pPr/>
-              <a:t>12/20/2020</a:t>
+              <a:t>12/26/2020</a:t>
             </a:fld>
             <a:endParaRPr lang="x-none"/>
           </a:p>
@@ -2589,7 +2589,7 @@
           <p:cNvPr id="8" name="Footer Placeholder 7">
             <a:extLst>
               <a:ext uri="{FF2B5EF4-FFF2-40B4-BE49-F238E27FC236}">
-                <a16:creationId xmlns="" xmlns:a16="http://schemas.microsoft.com/office/drawing/2014/main" id="{37B3C4F9-A415-DA4D-A53C-793BB6270FB4}"/>
+                <a16:creationId xmlns:a16="http://schemas.microsoft.com/office/drawing/2014/main" xmlns="" id="{37B3C4F9-A415-DA4D-A53C-793BB6270FB4}"/>
               </a:ext>
             </a:extLst>
           </p:cNvPr>
@@ -2614,7 +2614,7 @@
           <p:cNvPr id="9" name="Slide Number Placeholder 8">
             <a:extLst>
               <a:ext uri="{FF2B5EF4-FFF2-40B4-BE49-F238E27FC236}">
-                <a16:creationId xmlns="" xmlns:a16="http://schemas.microsoft.com/office/drawing/2014/main" id="{C7C2F445-6980-834F-B0FE-BB55FFD49830}"/>
+                <a16:creationId xmlns:a16="http://schemas.microsoft.com/office/drawing/2014/main" xmlns="" id="{C7C2F445-6980-834F-B0FE-BB55FFD49830}"/>
               </a:ext>
             </a:extLst>
           </p:cNvPr>
@@ -2674,7 +2674,7 @@
           <p:cNvPr id="6" name="Picture 5" descr="A picture containing sign, stop, reading, outdoor&#10;&#10;Description automatically generated">
             <a:extLst>
               <a:ext uri="{FF2B5EF4-FFF2-40B4-BE49-F238E27FC236}">
-                <a16:creationId xmlns="" xmlns:a16="http://schemas.microsoft.com/office/drawing/2014/main" id="{20B8AC15-AC2C-4E45-A1FB-5155B201A537}"/>
+                <a16:creationId xmlns:a16="http://schemas.microsoft.com/office/drawing/2014/main" xmlns="" id="{20B8AC15-AC2C-4E45-A1FB-5155B201A537}"/>
               </a:ext>
             </a:extLst>
           </p:cNvPr>
@@ -2703,7 +2703,7 @@
           <p:cNvPr id="2" name="Title 1">
             <a:extLst>
               <a:ext uri="{FF2B5EF4-FFF2-40B4-BE49-F238E27FC236}">
-                <a16:creationId xmlns="" xmlns:a16="http://schemas.microsoft.com/office/drawing/2014/main" id="{B53FC57E-415E-4241-BDE9-26B1D81D52A1}"/>
+                <a16:creationId xmlns:a16="http://schemas.microsoft.com/office/drawing/2014/main" xmlns="" id="{B53FC57E-415E-4241-BDE9-26B1D81D52A1}"/>
               </a:ext>
             </a:extLst>
           </p:cNvPr>
@@ -2737,7 +2737,7 @@
           <p:cNvPr id="3" name="Date Placeholder 2">
             <a:extLst>
               <a:ext uri="{FF2B5EF4-FFF2-40B4-BE49-F238E27FC236}">
-                <a16:creationId xmlns="" xmlns:a16="http://schemas.microsoft.com/office/drawing/2014/main" id="{1C12FD02-9CD7-3841-9DD2-8D3DF986F5AE}"/>
+                <a16:creationId xmlns:a16="http://schemas.microsoft.com/office/drawing/2014/main" xmlns="" id="{1C12FD02-9CD7-3841-9DD2-8D3DF986F5AE}"/>
               </a:ext>
             </a:extLst>
           </p:cNvPr>
@@ -2756,7 +2756,7 @@
             <a:fld id="{A3D8ACCB-D86A-8340-83DF-E9D64A929EB3}" type="datetimeFigureOut">
               <a:rPr lang="x-none" smtClean="0"/>
               <a:pPr/>
-              <a:t>12/20/2020</a:t>
+              <a:t>12/26/2020</a:t>
             </a:fld>
             <a:endParaRPr lang="x-none"/>
           </a:p>
@@ -2767,7 +2767,7 @@
           <p:cNvPr id="4" name="Footer Placeholder 3">
             <a:extLst>
               <a:ext uri="{FF2B5EF4-FFF2-40B4-BE49-F238E27FC236}">
-                <a16:creationId xmlns="" xmlns:a16="http://schemas.microsoft.com/office/drawing/2014/main" id="{AB0D34C8-64A2-8047-8C1E-CB7AE7062BB8}"/>
+                <a16:creationId xmlns:a16="http://schemas.microsoft.com/office/drawing/2014/main" xmlns="" id="{AB0D34C8-64A2-8047-8C1E-CB7AE7062BB8}"/>
               </a:ext>
             </a:extLst>
           </p:cNvPr>
@@ -2792,7 +2792,7 @@
           <p:cNvPr id="5" name="Slide Number Placeholder 4">
             <a:extLst>
               <a:ext uri="{FF2B5EF4-FFF2-40B4-BE49-F238E27FC236}">
-                <a16:creationId xmlns="" xmlns:a16="http://schemas.microsoft.com/office/drawing/2014/main" id="{94170CB7-19B1-C844-8636-B305CD53B963}"/>
+                <a16:creationId xmlns:a16="http://schemas.microsoft.com/office/drawing/2014/main" xmlns="" id="{94170CB7-19B1-C844-8636-B305CD53B963}"/>
               </a:ext>
             </a:extLst>
           </p:cNvPr>
@@ -2852,7 +2852,7 @@
           <p:cNvPr id="5" name="Picture 4" descr="A picture containing sign, stop, reading, outdoor&#10;&#10;Description automatically generated">
             <a:extLst>
               <a:ext uri="{FF2B5EF4-FFF2-40B4-BE49-F238E27FC236}">
-                <a16:creationId xmlns="" xmlns:a16="http://schemas.microsoft.com/office/drawing/2014/main" id="{AAFDFA7D-0949-CA4A-8E36-23085A137749}"/>
+                <a16:creationId xmlns:a16="http://schemas.microsoft.com/office/drawing/2014/main" xmlns="" id="{AAFDFA7D-0949-CA4A-8E36-23085A137749}"/>
               </a:ext>
             </a:extLst>
           </p:cNvPr>
@@ -2881,7 +2881,7 @@
           <p:cNvPr id="2" name="Date Placeholder 1">
             <a:extLst>
               <a:ext uri="{FF2B5EF4-FFF2-40B4-BE49-F238E27FC236}">
-                <a16:creationId xmlns="" xmlns:a16="http://schemas.microsoft.com/office/drawing/2014/main" id="{7FBD9A58-7CF6-7248-8411-8911F3A2F89B}"/>
+                <a16:creationId xmlns:a16="http://schemas.microsoft.com/office/drawing/2014/main" xmlns="" id="{7FBD9A58-7CF6-7248-8411-8911F3A2F89B}"/>
               </a:ext>
             </a:extLst>
           </p:cNvPr>
@@ -2900,7 +2900,7 @@
             <a:fld id="{A3D8ACCB-D86A-8340-83DF-E9D64A929EB3}" type="datetimeFigureOut">
               <a:rPr lang="x-none" smtClean="0"/>
               <a:pPr/>
-              <a:t>12/20/2020</a:t>
+              <a:t>12/26/2020</a:t>
             </a:fld>
             <a:endParaRPr lang="x-none"/>
           </a:p>
@@ -2911,7 +2911,7 @@
           <p:cNvPr id="3" name="Footer Placeholder 2">
             <a:extLst>
               <a:ext uri="{FF2B5EF4-FFF2-40B4-BE49-F238E27FC236}">
-                <a16:creationId xmlns="" xmlns:a16="http://schemas.microsoft.com/office/drawing/2014/main" id="{D2DC9410-7A47-924B-BF13-DCFD771CFE82}"/>
+                <a16:creationId xmlns:a16="http://schemas.microsoft.com/office/drawing/2014/main" xmlns="" id="{D2DC9410-7A47-924B-BF13-DCFD771CFE82}"/>
               </a:ext>
             </a:extLst>
           </p:cNvPr>
@@ -2936,7 +2936,7 @@
           <p:cNvPr id="4" name="Slide Number Placeholder 3">
             <a:extLst>
               <a:ext uri="{FF2B5EF4-FFF2-40B4-BE49-F238E27FC236}">
-                <a16:creationId xmlns="" xmlns:a16="http://schemas.microsoft.com/office/drawing/2014/main" id="{3B8A1259-5929-044D-A89E-F42C5C0E71EF}"/>
+                <a16:creationId xmlns:a16="http://schemas.microsoft.com/office/drawing/2014/main" xmlns="" id="{3B8A1259-5929-044D-A89E-F42C5C0E71EF}"/>
               </a:ext>
             </a:extLst>
           </p:cNvPr>
@@ -2996,7 +2996,7 @@
           <p:cNvPr id="8" name="Picture 7" descr="A picture containing sign, stop, reading, outdoor&#10;&#10;Description automatically generated">
             <a:extLst>
               <a:ext uri="{FF2B5EF4-FFF2-40B4-BE49-F238E27FC236}">
-                <a16:creationId xmlns="" xmlns:a16="http://schemas.microsoft.com/office/drawing/2014/main" id="{3357B3C3-F2C4-3D4C-A718-C55A0E579BFC}"/>
+                <a16:creationId xmlns:a16="http://schemas.microsoft.com/office/drawing/2014/main" xmlns="" id="{3357B3C3-F2C4-3D4C-A718-C55A0E579BFC}"/>
               </a:ext>
             </a:extLst>
           </p:cNvPr>
@@ -3025,7 +3025,7 @@
           <p:cNvPr id="2" name="Title 1">
             <a:extLst>
               <a:ext uri="{FF2B5EF4-FFF2-40B4-BE49-F238E27FC236}">
-                <a16:creationId xmlns="" xmlns:a16="http://schemas.microsoft.com/office/drawing/2014/main" id="{A0FF3B40-F123-C94C-A012-28CC6EFDA7B4}"/>
+                <a16:creationId xmlns:a16="http://schemas.microsoft.com/office/drawing/2014/main" xmlns="" id="{A0FF3B40-F123-C94C-A012-28CC6EFDA7B4}"/>
               </a:ext>
             </a:extLst>
           </p:cNvPr>
@@ -3063,7 +3063,7 @@
           <p:cNvPr id="3" name="Content Placeholder 2">
             <a:extLst>
               <a:ext uri="{FF2B5EF4-FFF2-40B4-BE49-F238E27FC236}">
-                <a16:creationId xmlns="" xmlns:a16="http://schemas.microsoft.com/office/drawing/2014/main" id="{65F29B67-AFD8-6240-B98B-930CEA21577D}"/>
+                <a16:creationId xmlns:a16="http://schemas.microsoft.com/office/drawing/2014/main" xmlns="" id="{65F29B67-AFD8-6240-B98B-930CEA21577D}"/>
               </a:ext>
             </a:extLst>
           </p:cNvPr>
@@ -3154,7 +3154,7 @@
           <p:cNvPr id="4" name="Text Placeholder 3">
             <a:extLst>
               <a:ext uri="{FF2B5EF4-FFF2-40B4-BE49-F238E27FC236}">
-                <a16:creationId xmlns="" xmlns:a16="http://schemas.microsoft.com/office/drawing/2014/main" id="{3D2AF10C-D19D-8146-B150-5BFF5A511D38}"/>
+                <a16:creationId xmlns:a16="http://schemas.microsoft.com/office/drawing/2014/main" xmlns="" id="{3D2AF10C-D19D-8146-B150-5BFF5A511D38}"/>
               </a:ext>
             </a:extLst>
           </p:cNvPr>
@@ -3225,7 +3225,7 @@
           <p:cNvPr id="5" name="Date Placeholder 4">
             <a:extLst>
               <a:ext uri="{FF2B5EF4-FFF2-40B4-BE49-F238E27FC236}">
-                <a16:creationId xmlns="" xmlns:a16="http://schemas.microsoft.com/office/drawing/2014/main" id="{E74DAC58-D248-1D4D-8918-03D250814225}"/>
+                <a16:creationId xmlns:a16="http://schemas.microsoft.com/office/drawing/2014/main" xmlns="" id="{E74DAC58-D248-1D4D-8918-03D250814225}"/>
               </a:ext>
             </a:extLst>
           </p:cNvPr>
@@ -3244,7 +3244,7 @@
             <a:fld id="{A3D8ACCB-D86A-8340-83DF-E9D64A929EB3}" type="datetimeFigureOut">
               <a:rPr lang="x-none" smtClean="0"/>
               <a:pPr/>
-              <a:t>12/20/2020</a:t>
+              <a:t>12/26/2020</a:t>
             </a:fld>
             <a:endParaRPr lang="x-none"/>
           </a:p>
@@ -3255,7 +3255,7 @@
           <p:cNvPr id="6" name="Footer Placeholder 5">
             <a:extLst>
               <a:ext uri="{FF2B5EF4-FFF2-40B4-BE49-F238E27FC236}">
-                <a16:creationId xmlns="" xmlns:a16="http://schemas.microsoft.com/office/drawing/2014/main" id="{ED140BD3-309C-0F40-A28D-466648D79522}"/>
+                <a16:creationId xmlns:a16="http://schemas.microsoft.com/office/drawing/2014/main" xmlns="" id="{ED140BD3-309C-0F40-A28D-466648D79522}"/>
               </a:ext>
             </a:extLst>
           </p:cNvPr>
@@ -3280,7 +3280,7 @@
           <p:cNvPr id="7" name="Slide Number Placeholder 6">
             <a:extLst>
               <a:ext uri="{FF2B5EF4-FFF2-40B4-BE49-F238E27FC236}">
-                <a16:creationId xmlns="" xmlns:a16="http://schemas.microsoft.com/office/drawing/2014/main" id="{C93653F0-3A56-8342-ABD3-96B45C765B26}"/>
+                <a16:creationId xmlns:a16="http://schemas.microsoft.com/office/drawing/2014/main" xmlns="" id="{C93653F0-3A56-8342-ABD3-96B45C765B26}"/>
               </a:ext>
             </a:extLst>
           </p:cNvPr>
@@ -3340,7 +3340,7 @@
           <p:cNvPr id="8" name="Picture 7" descr="A picture containing sign, stop, reading, outdoor&#10;&#10;Description automatically generated">
             <a:extLst>
               <a:ext uri="{FF2B5EF4-FFF2-40B4-BE49-F238E27FC236}">
-                <a16:creationId xmlns="" xmlns:a16="http://schemas.microsoft.com/office/drawing/2014/main" id="{9133BD43-EC33-ED49-B4F0-126136EAB125}"/>
+                <a16:creationId xmlns:a16="http://schemas.microsoft.com/office/drawing/2014/main" xmlns="" id="{9133BD43-EC33-ED49-B4F0-126136EAB125}"/>
               </a:ext>
             </a:extLst>
           </p:cNvPr>
@@ -3369,7 +3369,7 @@
           <p:cNvPr id="2" name="Title 1">
             <a:extLst>
               <a:ext uri="{FF2B5EF4-FFF2-40B4-BE49-F238E27FC236}">
-                <a16:creationId xmlns="" xmlns:a16="http://schemas.microsoft.com/office/drawing/2014/main" id="{F6EC2B8C-0930-F843-B4D0-5C70387799F5}"/>
+                <a16:creationId xmlns:a16="http://schemas.microsoft.com/office/drawing/2014/main" xmlns="" id="{F6EC2B8C-0930-F843-B4D0-5C70387799F5}"/>
               </a:ext>
             </a:extLst>
           </p:cNvPr>
@@ -3407,7 +3407,7 @@
           <p:cNvPr id="3" name="Picture Placeholder 2">
             <a:extLst>
               <a:ext uri="{FF2B5EF4-FFF2-40B4-BE49-F238E27FC236}">
-                <a16:creationId xmlns="" xmlns:a16="http://schemas.microsoft.com/office/drawing/2014/main" id="{F9045866-30BB-EA40-B000-B55142177998}"/>
+                <a16:creationId xmlns:a16="http://schemas.microsoft.com/office/drawing/2014/main" xmlns="" id="{F9045866-30BB-EA40-B000-B55142177998}"/>
               </a:ext>
             </a:extLst>
           </p:cNvPr>
@@ -3474,7 +3474,7 @@
           <p:cNvPr id="4" name="Text Placeholder 3">
             <a:extLst>
               <a:ext uri="{FF2B5EF4-FFF2-40B4-BE49-F238E27FC236}">
-                <a16:creationId xmlns="" xmlns:a16="http://schemas.microsoft.com/office/drawing/2014/main" id="{044AC284-99DE-DB43-8762-60BF87336657}"/>
+                <a16:creationId xmlns:a16="http://schemas.microsoft.com/office/drawing/2014/main" xmlns="" id="{044AC284-99DE-DB43-8762-60BF87336657}"/>
               </a:ext>
             </a:extLst>
           </p:cNvPr>
@@ -3545,7 +3545,7 @@
           <p:cNvPr id="5" name="Date Placeholder 4">
             <a:extLst>
               <a:ext uri="{FF2B5EF4-FFF2-40B4-BE49-F238E27FC236}">
-                <a16:creationId xmlns="" xmlns:a16="http://schemas.microsoft.com/office/drawing/2014/main" id="{9EF199FE-9F50-CA41-85DF-E2F12E3290A5}"/>
+                <a16:creationId xmlns:a16="http://schemas.microsoft.com/office/drawing/2014/main" xmlns="" id="{9EF199FE-9F50-CA41-85DF-E2F12E3290A5}"/>
               </a:ext>
             </a:extLst>
           </p:cNvPr>
@@ -3564,7 +3564,7 @@
             <a:fld id="{A3D8ACCB-D86A-8340-83DF-E9D64A929EB3}" type="datetimeFigureOut">
               <a:rPr lang="x-none" smtClean="0"/>
               <a:pPr/>
-              <a:t>12/20/2020</a:t>
+              <a:t>12/26/2020</a:t>
             </a:fld>
             <a:endParaRPr lang="x-none"/>
           </a:p>
@@ -3575,7 +3575,7 @@
           <p:cNvPr id="6" name="Footer Placeholder 5">
             <a:extLst>
               <a:ext uri="{FF2B5EF4-FFF2-40B4-BE49-F238E27FC236}">
-                <a16:creationId xmlns="" xmlns:a16="http://schemas.microsoft.com/office/drawing/2014/main" id="{A0636851-7549-324F-8F82-1C1E6CC03BC5}"/>
+                <a16:creationId xmlns:a16="http://schemas.microsoft.com/office/drawing/2014/main" xmlns="" id="{A0636851-7549-324F-8F82-1C1E6CC03BC5}"/>
               </a:ext>
             </a:extLst>
           </p:cNvPr>
@@ -3600,7 +3600,7 @@
           <p:cNvPr id="7" name="Slide Number Placeholder 6">
             <a:extLst>
               <a:ext uri="{FF2B5EF4-FFF2-40B4-BE49-F238E27FC236}">
-                <a16:creationId xmlns="" xmlns:a16="http://schemas.microsoft.com/office/drawing/2014/main" id="{9ED1C492-D0E6-C14C-BCBD-1A3D9D06E85B}"/>
+                <a16:creationId xmlns:a16="http://schemas.microsoft.com/office/drawing/2014/main" xmlns="" id="{9ED1C492-D0E6-C14C-BCBD-1A3D9D06E85B}"/>
               </a:ext>
             </a:extLst>
           </p:cNvPr>
@@ -3665,7 +3665,7 @@
           <p:cNvPr id="7" name="Picture 6" descr="A picture containing sign, stop, reading, outdoor&#10;&#10;Description automatically generated">
             <a:extLst>
               <a:ext uri="{FF2B5EF4-FFF2-40B4-BE49-F238E27FC236}">
-                <a16:creationId xmlns="" xmlns:a16="http://schemas.microsoft.com/office/drawing/2014/main" id="{13984A72-8A47-B847-AE6B-87719D400665}"/>
+                <a16:creationId xmlns:a16="http://schemas.microsoft.com/office/drawing/2014/main" xmlns="" id="{13984A72-8A47-B847-AE6B-87719D400665}"/>
               </a:ext>
             </a:extLst>
           </p:cNvPr>
@@ -3694,7 +3694,7 @@
           <p:cNvPr id="2" name="Title Placeholder 1">
             <a:extLst>
               <a:ext uri="{FF2B5EF4-FFF2-40B4-BE49-F238E27FC236}">
-                <a16:creationId xmlns="" xmlns:a16="http://schemas.microsoft.com/office/drawing/2014/main" id="{62EE0ECE-6ADC-684B-B553-178FFB07FD86}"/>
+                <a16:creationId xmlns:a16="http://schemas.microsoft.com/office/drawing/2014/main" xmlns="" id="{62EE0ECE-6ADC-684B-B553-178FFB07FD86}"/>
               </a:ext>
             </a:extLst>
           </p:cNvPr>
@@ -3733,7 +3733,7 @@
           <p:cNvPr id="3" name="Text Placeholder 2">
             <a:extLst>
               <a:ext uri="{FF2B5EF4-FFF2-40B4-BE49-F238E27FC236}">
-                <a16:creationId xmlns="" xmlns:a16="http://schemas.microsoft.com/office/drawing/2014/main" id="{4C883D33-787A-F84E-AF9E-78809EA3CC53}"/>
+                <a16:creationId xmlns:a16="http://schemas.microsoft.com/office/drawing/2014/main" xmlns="" id="{4C883D33-787A-F84E-AF9E-78809EA3CC53}"/>
               </a:ext>
             </a:extLst>
           </p:cNvPr>
@@ -3801,7 +3801,7 @@
           <p:cNvPr id="4" name="Date Placeholder 3">
             <a:extLst>
               <a:ext uri="{FF2B5EF4-FFF2-40B4-BE49-F238E27FC236}">
-                <a16:creationId xmlns="" xmlns:a16="http://schemas.microsoft.com/office/drawing/2014/main" id="{216B7BE0-4202-E14F-9F88-C5E102DAC43F}"/>
+                <a16:creationId xmlns:a16="http://schemas.microsoft.com/office/drawing/2014/main" xmlns="" id="{216B7BE0-4202-E14F-9F88-C5E102DAC43F}"/>
               </a:ext>
             </a:extLst>
           </p:cNvPr>
@@ -3836,7 +3836,7 @@
             <a:fld id="{A3D8ACCB-D86A-8340-83DF-E9D64A929EB3}" type="datetimeFigureOut">
               <a:rPr lang="x-none" smtClean="0"/>
               <a:pPr/>
-              <a:t>12/20/2020</a:t>
+              <a:t>12/26/2020</a:t>
             </a:fld>
             <a:endParaRPr lang="x-none" dirty="0"/>
           </a:p>
@@ -3847,7 +3847,7 @@
           <p:cNvPr id="5" name="Footer Placeholder 4">
             <a:extLst>
               <a:ext uri="{FF2B5EF4-FFF2-40B4-BE49-F238E27FC236}">
-                <a16:creationId xmlns="" xmlns:a16="http://schemas.microsoft.com/office/drawing/2014/main" id="{EB394D20-A839-AE45-928D-CEB599D07CB8}"/>
+                <a16:creationId xmlns:a16="http://schemas.microsoft.com/office/drawing/2014/main" xmlns="" id="{EB394D20-A839-AE45-928D-CEB599D07CB8}"/>
               </a:ext>
             </a:extLst>
           </p:cNvPr>
@@ -3888,7 +3888,7 @@
           <p:cNvPr id="6" name="Slide Number Placeholder 5">
             <a:extLst>
               <a:ext uri="{FF2B5EF4-FFF2-40B4-BE49-F238E27FC236}">
-                <a16:creationId xmlns="" xmlns:a16="http://schemas.microsoft.com/office/drawing/2014/main" id="{02AF3331-795A-2E41-80FC-465428316740}"/>
+                <a16:creationId xmlns:a16="http://schemas.microsoft.com/office/drawing/2014/main" xmlns="" id="{02AF3331-795A-2E41-80FC-465428316740}"/>
               </a:ext>
             </a:extLst>
           </p:cNvPr>
@@ -3934,7 +3934,7 @@
           <p:cNvPr id="8" name="Picture 7" descr="A close up of a logo&#10;&#10;Description automatically generated">
             <a:extLst>
               <a:ext uri="{FF2B5EF4-FFF2-40B4-BE49-F238E27FC236}">
-                <a16:creationId xmlns="" xmlns:a16="http://schemas.microsoft.com/office/drawing/2014/main" id="{B1B30192-0367-D943-8F72-A362FE5B959C}"/>
+                <a16:creationId xmlns:a16="http://schemas.microsoft.com/office/drawing/2014/main" xmlns="" id="{B1B30192-0367-D943-8F72-A362FE5B959C}"/>
               </a:ext>
             </a:extLst>
           </p:cNvPr>
@@ -3963,7 +3963,7 @@
           <p:cNvPr id="9" name="Picture 8" descr="A close up of a logo&#10;&#10;Description automatically generated">
             <a:extLst>
               <a:ext uri="{FF2B5EF4-FFF2-40B4-BE49-F238E27FC236}">
-                <a16:creationId xmlns="" xmlns:a16="http://schemas.microsoft.com/office/drawing/2014/main" id="{29D41A54-6D58-AF48-B7EC-C7449211F71B}"/>
+                <a16:creationId xmlns:a16="http://schemas.microsoft.com/office/drawing/2014/main" xmlns="" id="{29D41A54-6D58-AF48-B7EC-C7449211F71B}"/>
               </a:ext>
             </a:extLst>
           </p:cNvPr>
@@ -4313,7 +4313,7 @@
           <p:cNvPr id="2" name="Title 1">
             <a:extLst>
               <a:ext uri="{FF2B5EF4-FFF2-40B4-BE49-F238E27FC236}">
-                <a16:creationId xmlns="" xmlns:a16="http://schemas.microsoft.com/office/drawing/2014/main" id="{AD10D66B-F750-204D-B5DE-C8D05398074C}"/>
+                <a16:creationId xmlns:a16="http://schemas.microsoft.com/office/drawing/2014/main" xmlns="" id="{AD10D66B-F750-204D-B5DE-C8D05398074C}"/>
               </a:ext>
             </a:extLst>
           </p:cNvPr>
@@ -4348,7 +4348,7 @@
           <p:cNvPr id="3" name="Subtitle 2">
             <a:extLst>
               <a:ext uri="{FF2B5EF4-FFF2-40B4-BE49-F238E27FC236}">
-                <a16:creationId xmlns="" xmlns:a16="http://schemas.microsoft.com/office/drawing/2014/main" id="{35297DC4-6EF6-7B4A-9DA9-00409F3E5E44}"/>
+                <a16:creationId xmlns:a16="http://schemas.microsoft.com/office/drawing/2014/main" xmlns="" id="{35297DC4-6EF6-7B4A-9DA9-00409F3E5E44}"/>
               </a:ext>
             </a:extLst>
           </p:cNvPr>
@@ -6040,8 +6040,12 @@
               <a:t>представља </a:t>
             </a:r>
             <a:r>
+              <a:rPr lang="ru-RU" dirty="0" smtClean="0"/>
+              <a:t>реч </a:t>
+            </a:r>
+            <a:r>
               <a:rPr lang="ru-RU" dirty="0"/>
-              <a:t>реченицу језика </a:t>
+              <a:t>језика </a:t>
             </a:r>
             <a:r>
               <a:rPr lang="sr-Latn-RS" dirty="0" smtClean="0"/>
@@ -6291,7 +6295,7 @@
         </p:blipFill>
         <p:spPr>
           <a:xfrm>
-            <a:off x="10901268" y="4246749"/>
+            <a:off x="9978630" y="4248904"/>
             <a:ext cx="304800" cy="400050"/>
           </a:xfrm>
           <a:prstGeom prst="rect">
@@ -6707,9 +6711,118 @@
           </a:prstGeom>
         </p:spPr>
       </p:pic>
+      <p:sp>
+        <p:nvSpPr>
+          <p:cNvPr id="14" name="Content Placeholder 2"/>
+          <p:cNvSpPr>
+            <a:spLocks noGrp="1"/>
+          </p:cNvSpPr>
+          <p:nvPr>
+            <p:ph sz="half" idx="1"/>
+          </p:nvPr>
+        </p:nvSpPr>
+        <p:spPr>
+          <a:xfrm>
+            <a:off x="504243" y="5284510"/>
+            <a:ext cx="10797073" cy="917575"/>
+          </a:xfrm>
+        </p:spPr>
+        <p:txBody>
+          <a:bodyPr/>
+          <a:lstStyle/>
+          <a:p>
+            <a:pPr marL="0" indent="0">
+              <a:buNone/>
+            </a:pPr>
+            <a:r>
+              <a:rPr lang="sr-Cyrl-RS" dirty="0" smtClean="0">
+                <a:solidFill>
+                  <a:srgbClr val="C00000"/>
+                </a:solidFill>
+              </a:rPr>
+              <a:t>Деф. </a:t>
+            </a:r>
+            <a:r>
+              <a:rPr lang="ru-RU" dirty="0"/>
+              <a:t>Уколико се језик може представити регуларним изразом, такав </a:t>
+            </a:r>
+            <a:r>
+              <a:rPr lang="ru-RU" dirty="0" smtClean="0"/>
+              <a:t>језик се </a:t>
+            </a:r>
+            <a:r>
+              <a:rPr lang="ru-RU" dirty="0"/>
+              <a:t>сматра регуларним.</a:t>
+            </a:r>
+            <a:endParaRPr lang="en-US" dirty="0"/>
+          </a:p>
+        </p:txBody>
+      </p:sp>
+      <p:sp>
+        <p:nvSpPr>
+          <p:cNvPr id="15" name="TextBox 14"/>
+          <p:cNvSpPr txBox="1"/>
+          <p:nvPr/>
+        </p:nvSpPr>
+        <p:spPr>
+          <a:xfrm>
+            <a:off x="11058525" y="5686425"/>
+            <a:ext cx="914400" cy="369332"/>
+          </a:xfrm>
+          <a:prstGeom prst="rect">
+            <a:avLst/>
+          </a:prstGeom>
+          <a:noFill/>
+        </p:spPr>
+        <p:txBody>
+          <a:bodyPr wrap="square" rtlCol="0">
+            <a:spAutoFit/>
+          </a:bodyPr>
+          <a:lstStyle/>
+          <a:p>
+            <a:r>
+              <a:rPr lang="en-US" dirty="0" smtClean="0">
+                <a:solidFill>
+                  <a:schemeClr val="bg1">
+                    <a:lumMod val="75000"/>
+                  </a:schemeClr>
+                </a:solidFill>
+              </a:rPr>
+              <a:t>[</a:t>
+            </a:r>
+            <a:r>
+              <a:rPr lang="sr-Cyrl-RS" dirty="0" smtClean="0">
+                <a:solidFill>
+                  <a:schemeClr val="bg1">
+                    <a:lumMod val="75000"/>
+                  </a:schemeClr>
+                </a:solidFill>
+              </a:rPr>
+              <a:t>1</a:t>
+            </a:r>
+            <a:r>
+              <a:rPr lang="en-US" dirty="0" smtClean="0">
+                <a:solidFill>
+                  <a:schemeClr val="bg1">
+                    <a:lumMod val="75000"/>
+                  </a:schemeClr>
+                </a:solidFill>
+              </a:rPr>
+              <a:t>4/34]</a:t>
+            </a:r>
+            <a:endParaRPr lang="en-US" dirty="0">
+              <a:solidFill>
+                <a:schemeClr val="bg1">
+                  <a:lumMod val="75000"/>
+                </a:schemeClr>
+              </a:solidFill>
+            </a:endParaRPr>
+          </a:p>
+        </p:txBody>
+      </p:sp>
       <p:pic>
         <p:nvPicPr>
-          <p:cNvPr id="9" name="Picture 8"/>
+          <p:cNvPr id="2" name="Picture 1"/>
           <p:cNvPicPr>
             <a:picLocks noChangeAspect="1"/>
           </p:cNvPicPr>
@@ -6723,8 +6836,8 @@
         </p:blipFill>
         <p:spPr>
           <a:xfrm>
-            <a:off x="3919923" y="3434173"/>
-            <a:ext cx="5863590" cy="521208"/>
+            <a:off x="3994571" y="3497721"/>
+            <a:ext cx="5389431" cy="438912"/>
           </a:xfrm>
           <a:prstGeom prst="rect">
             <a:avLst/>
@@ -6733,7 +6846,7 @@
       </p:pic>
       <p:pic>
         <p:nvPicPr>
-          <p:cNvPr id="11" name="Picture 10"/>
+          <p:cNvPr id="13" name="Picture 12"/>
           <p:cNvPicPr>
             <a:picLocks noChangeAspect="1"/>
           </p:cNvPicPr>
@@ -6747,8 +6860,8 @@
         </p:blipFill>
         <p:spPr>
           <a:xfrm>
-            <a:off x="4535820" y="4487333"/>
-            <a:ext cx="2733921" cy="740664"/>
+            <a:off x="4583450" y="4517010"/>
+            <a:ext cx="1574800" cy="731520"/>
           </a:xfrm>
           <a:prstGeom prst="rect">
             <a:avLst/>
@@ -6771,7 +6884,7 @@
         </p:blipFill>
         <p:spPr>
           <a:xfrm>
-            <a:off x="4475252" y="3978606"/>
+            <a:off x="4475252" y="3959356"/>
             <a:ext cx="1665469" cy="694944"/>
           </a:xfrm>
           <a:prstGeom prst="rect">
@@ -6779,115 +6892,6 @@
           </a:prstGeom>
         </p:spPr>
       </p:pic>
-      <p:sp>
-        <p:nvSpPr>
-          <p:cNvPr id="14" name="Content Placeholder 2"/>
-          <p:cNvSpPr>
-            <a:spLocks noGrp="1"/>
-          </p:cNvSpPr>
-          <p:nvPr>
-            <p:ph sz="half" idx="1"/>
-          </p:nvPr>
-        </p:nvSpPr>
-        <p:spPr>
-          <a:xfrm>
-            <a:off x="504243" y="5284510"/>
-            <a:ext cx="10797073" cy="917575"/>
-          </a:xfrm>
-        </p:spPr>
-        <p:txBody>
-          <a:bodyPr/>
-          <a:lstStyle/>
-          <a:p>
-            <a:pPr marL="0" indent="0">
-              <a:buNone/>
-            </a:pPr>
-            <a:r>
-              <a:rPr lang="sr-Cyrl-RS" dirty="0" smtClean="0">
-                <a:solidFill>
-                  <a:srgbClr val="C00000"/>
-                </a:solidFill>
-              </a:rPr>
-              <a:t>Деф. </a:t>
-            </a:r>
-            <a:r>
-              <a:rPr lang="ru-RU" dirty="0"/>
-              <a:t>Уколико се језик може представити регуларним изразом, такав </a:t>
-            </a:r>
-            <a:r>
-              <a:rPr lang="ru-RU" dirty="0" smtClean="0"/>
-              <a:t>језик се </a:t>
-            </a:r>
-            <a:r>
-              <a:rPr lang="ru-RU" dirty="0"/>
-              <a:t>сматра регуларним.</a:t>
-            </a:r>
-            <a:endParaRPr lang="en-US" dirty="0"/>
-          </a:p>
-        </p:txBody>
-      </p:sp>
-      <p:sp>
-        <p:nvSpPr>
-          <p:cNvPr id="15" name="TextBox 14"/>
-          <p:cNvSpPr txBox="1"/>
-          <p:nvPr/>
-        </p:nvSpPr>
-        <p:spPr>
-          <a:xfrm>
-            <a:off x="11058525" y="5686425"/>
-            <a:ext cx="914400" cy="369332"/>
-          </a:xfrm>
-          <a:prstGeom prst="rect">
-            <a:avLst/>
-          </a:prstGeom>
-          <a:noFill/>
-        </p:spPr>
-        <p:txBody>
-          <a:bodyPr wrap="square" rtlCol="0">
-            <a:spAutoFit/>
-          </a:bodyPr>
-          <a:lstStyle/>
-          <a:p>
-            <a:r>
-              <a:rPr lang="en-US" dirty="0" smtClean="0">
-                <a:solidFill>
-                  <a:schemeClr val="bg1">
-                    <a:lumMod val="75000"/>
-                  </a:schemeClr>
-                </a:solidFill>
-              </a:rPr>
-              <a:t>[</a:t>
-            </a:r>
-            <a:r>
-              <a:rPr lang="sr-Cyrl-RS" dirty="0" smtClean="0">
-                <a:solidFill>
-                  <a:schemeClr val="bg1">
-                    <a:lumMod val="75000"/>
-                  </a:schemeClr>
-                </a:solidFill>
-              </a:rPr>
-              <a:t>1</a:t>
-            </a:r>
-            <a:r>
-              <a:rPr lang="en-US" dirty="0" smtClean="0">
-                <a:solidFill>
-                  <a:schemeClr val="bg1">
-                    <a:lumMod val="75000"/>
-                  </a:schemeClr>
-                </a:solidFill>
-              </a:rPr>
-              <a:t>4/34]</a:t>
-            </a:r>
-            <a:endParaRPr lang="en-US" dirty="0">
-              <a:solidFill>
-                <a:schemeClr val="bg1">
-                  <a:lumMod val="75000"/>
-                </a:schemeClr>
-              </a:solidFill>
-            </a:endParaRPr>
-          </a:p>
-        </p:txBody>
-      </p:sp>
     </p:spTree>
     <p:extLst>
       <p:ext uri="{BB962C8B-B14F-4D97-AF65-F5344CB8AC3E}">
@@ -7394,7 +7398,7 @@
       </p:pic>
       <p:pic>
         <p:nvPicPr>
-          <p:cNvPr id="14" name="Picture 13"/>
+          <p:cNvPr id="15" name="Picture 14"/>
           <p:cNvPicPr>
             <a:picLocks noChangeAspect="1"/>
           </p:cNvPicPr>
@@ -7408,8 +7412,8 @@
         </p:blipFill>
         <p:spPr>
           <a:xfrm>
-            <a:off x="891748" y="4009696"/>
-            <a:ext cx="954156" cy="365760"/>
+            <a:off x="925277" y="4403449"/>
+            <a:ext cx="571986" cy="384048"/>
           </a:xfrm>
           <a:prstGeom prst="rect">
             <a:avLst/>
@@ -7418,7 +7422,7 @@
       </p:pic>
       <p:pic>
         <p:nvPicPr>
-          <p:cNvPr id="15" name="Picture 14"/>
+          <p:cNvPr id="16" name="Picture 15"/>
           <p:cNvPicPr>
             <a:picLocks noChangeAspect="1"/>
           </p:cNvPicPr>
@@ -7432,8 +7436,8 @@
         </p:blipFill>
         <p:spPr>
           <a:xfrm>
-            <a:off x="925277" y="4403449"/>
-            <a:ext cx="571986" cy="384048"/>
+            <a:off x="955916" y="4809916"/>
+            <a:ext cx="487680" cy="365760"/>
           </a:xfrm>
           <a:prstGeom prst="rect">
             <a:avLst/>
@@ -7442,7 +7446,7 @@
       </p:pic>
       <p:pic>
         <p:nvPicPr>
-          <p:cNvPr id="16" name="Picture 15"/>
+          <p:cNvPr id="17" name="Picture 16"/>
           <p:cNvPicPr>
             <a:picLocks noChangeAspect="1"/>
           </p:cNvPicPr>
@@ -7456,8 +7460,8 @@
         </p:blipFill>
         <p:spPr>
           <a:xfrm>
-            <a:off x="955916" y="4809916"/>
-            <a:ext cx="487680" cy="365760"/>
+            <a:off x="899895" y="5194338"/>
+            <a:ext cx="446227" cy="365760"/>
           </a:xfrm>
           <a:prstGeom prst="rect">
             <a:avLst/>
@@ -7466,7 +7470,7 @@
       </p:pic>
       <p:pic>
         <p:nvPicPr>
-          <p:cNvPr id="17" name="Picture 16"/>
+          <p:cNvPr id="18" name="Picture 17"/>
           <p:cNvPicPr>
             <a:picLocks noChangeAspect="1"/>
           </p:cNvPicPr>
@@ -7480,8 +7484,8 @@
         </p:blipFill>
         <p:spPr>
           <a:xfrm>
-            <a:off x="899895" y="5194338"/>
-            <a:ext cx="446227" cy="365760"/>
+            <a:off x="7091010" y="4010243"/>
+            <a:ext cx="1440180" cy="411480"/>
           </a:xfrm>
           <a:prstGeom prst="rect">
             <a:avLst/>
@@ -7490,7 +7494,7 @@
       </p:pic>
       <p:pic>
         <p:nvPicPr>
-          <p:cNvPr id="18" name="Picture 17"/>
+          <p:cNvPr id="19" name="Picture 18"/>
           <p:cNvPicPr>
             <a:picLocks noChangeAspect="1"/>
           </p:cNvPicPr>
@@ -7504,8 +7508,8 @@
         </p:blipFill>
         <p:spPr>
           <a:xfrm>
-            <a:off x="7091010" y="4010243"/>
-            <a:ext cx="1440180" cy="411480"/>
+            <a:off x="6742369" y="4434573"/>
+            <a:ext cx="1168146" cy="384048"/>
           </a:xfrm>
           <a:prstGeom prst="rect">
             <a:avLst/>
@@ -7514,7 +7518,7 @@
       </p:pic>
       <p:pic>
         <p:nvPicPr>
-          <p:cNvPr id="19" name="Picture 18"/>
+          <p:cNvPr id="20" name="Picture 19"/>
           <p:cNvPicPr>
             <a:picLocks noChangeAspect="1"/>
           </p:cNvPicPr>
@@ -7528,8 +7532,8 @@
         </p:blipFill>
         <p:spPr>
           <a:xfrm>
-            <a:off x="6742369" y="4434573"/>
-            <a:ext cx="1168146" cy="384048"/>
+            <a:off x="6723707" y="4834486"/>
+            <a:ext cx="896112" cy="384048"/>
           </a:xfrm>
           <a:prstGeom prst="rect">
             <a:avLst/>
@@ -7538,7 +7542,7 @@
       </p:pic>
       <p:pic>
         <p:nvPicPr>
-          <p:cNvPr id="20" name="Picture 19"/>
+          <p:cNvPr id="21" name="Picture 20"/>
           <p:cNvPicPr>
             <a:picLocks noChangeAspect="1"/>
           </p:cNvPicPr>
@@ -7552,17 +7556,79 @@
         </p:blipFill>
         <p:spPr>
           <a:xfrm>
-            <a:off x="6723707" y="4834486"/>
-            <a:ext cx="896112" cy="384048"/>
+            <a:off x="6520868" y="5213741"/>
+            <a:ext cx="583753" cy="384048"/>
           </a:xfrm>
           <a:prstGeom prst="rect">
             <a:avLst/>
           </a:prstGeom>
         </p:spPr>
       </p:pic>
+      <p:sp>
+        <p:nvSpPr>
+          <p:cNvPr id="22" name="TextBox 21"/>
+          <p:cNvSpPr txBox="1"/>
+          <p:nvPr/>
+        </p:nvSpPr>
+        <p:spPr>
+          <a:xfrm>
+            <a:off x="11058525" y="5686425"/>
+            <a:ext cx="914400" cy="369332"/>
+          </a:xfrm>
+          <a:prstGeom prst="rect">
+            <a:avLst/>
+          </a:prstGeom>
+          <a:noFill/>
+        </p:spPr>
+        <p:txBody>
+          <a:bodyPr wrap="square" rtlCol="0">
+            <a:spAutoFit/>
+          </a:bodyPr>
+          <a:lstStyle/>
+          <a:p>
+            <a:r>
+              <a:rPr lang="en-US" dirty="0" smtClean="0">
+                <a:solidFill>
+                  <a:schemeClr val="bg1">
+                    <a:lumMod val="75000"/>
+                  </a:schemeClr>
+                </a:solidFill>
+              </a:rPr>
+              <a:t>[</a:t>
+            </a:r>
+            <a:r>
+              <a:rPr lang="sr-Cyrl-RS" dirty="0" smtClean="0">
+                <a:solidFill>
+                  <a:schemeClr val="bg1">
+                    <a:lumMod val="75000"/>
+                  </a:schemeClr>
+                </a:solidFill>
+              </a:rPr>
+              <a:t>15</a:t>
+            </a:r>
+            <a:r>
+              <a:rPr lang="en-US" dirty="0" smtClean="0">
+                <a:solidFill>
+                  <a:schemeClr val="bg1">
+                    <a:lumMod val="75000"/>
+                  </a:schemeClr>
+                </a:solidFill>
+              </a:rPr>
+              <a:t>/34]</a:t>
+            </a:r>
+            <a:endParaRPr lang="en-US" dirty="0">
+              <a:solidFill>
+                <a:schemeClr val="bg1">
+                  <a:lumMod val="75000"/>
+                </a:schemeClr>
+              </a:solidFill>
+            </a:endParaRPr>
+          </a:p>
+        </p:txBody>
+      </p:sp>
       <p:pic>
         <p:nvPicPr>
-          <p:cNvPr id="21" name="Picture 20"/>
+          <p:cNvPr id="2" name="Picture 1"/>
           <p:cNvPicPr>
             <a:picLocks noChangeAspect="1"/>
           </p:cNvPicPr>
@@ -7576,76 +7642,14 @@
         </p:blipFill>
         <p:spPr>
           <a:xfrm>
-            <a:off x="6520868" y="5213741"/>
-            <a:ext cx="583753" cy="384048"/>
+            <a:off x="831772" y="4022449"/>
+            <a:ext cx="1028700" cy="381000"/>
           </a:xfrm>
           <a:prstGeom prst="rect">
             <a:avLst/>
           </a:prstGeom>
         </p:spPr>
       </p:pic>
-      <p:sp>
-        <p:nvSpPr>
-          <p:cNvPr id="22" name="TextBox 21"/>
-          <p:cNvSpPr txBox="1"/>
-          <p:nvPr/>
-        </p:nvSpPr>
-        <p:spPr>
-          <a:xfrm>
-            <a:off x="11058525" y="5686425"/>
-            <a:ext cx="914400" cy="369332"/>
-          </a:xfrm>
-          <a:prstGeom prst="rect">
-            <a:avLst/>
-          </a:prstGeom>
-          <a:noFill/>
-        </p:spPr>
-        <p:txBody>
-          <a:bodyPr wrap="square" rtlCol="0">
-            <a:spAutoFit/>
-          </a:bodyPr>
-          <a:lstStyle/>
-          <a:p>
-            <a:r>
-              <a:rPr lang="en-US" dirty="0" smtClean="0">
-                <a:solidFill>
-                  <a:schemeClr val="bg1">
-                    <a:lumMod val="75000"/>
-                  </a:schemeClr>
-                </a:solidFill>
-              </a:rPr>
-              <a:t>[</a:t>
-            </a:r>
-            <a:r>
-              <a:rPr lang="sr-Cyrl-RS" dirty="0" smtClean="0">
-                <a:solidFill>
-                  <a:schemeClr val="bg1">
-                    <a:lumMod val="75000"/>
-                  </a:schemeClr>
-                </a:solidFill>
-              </a:rPr>
-              <a:t>15</a:t>
-            </a:r>
-            <a:r>
-              <a:rPr lang="en-US" dirty="0" smtClean="0">
-                <a:solidFill>
-                  <a:schemeClr val="bg1">
-                    <a:lumMod val="75000"/>
-                  </a:schemeClr>
-                </a:solidFill>
-              </a:rPr>
-              <a:t>/34]</a:t>
-            </a:r>
-            <a:endParaRPr lang="en-US" dirty="0">
-              <a:solidFill>
-                <a:schemeClr val="bg1">
-                  <a:lumMod val="75000"/>
-                </a:schemeClr>
-              </a:solidFill>
-            </a:endParaRPr>
-          </a:p>
-        </p:txBody>
-      </p:sp>
     </p:spTree>
     <p:extLst>
       <p:ext uri="{BB962C8B-B14F-4D97-AF65-F5344CB8AC3E}">
@@ -8424,8 +8428,25 @@
             </a:r>
             <a:r>
               <a:rPr lang="sr-Cyrl-RS" dirty="0" smtClean="0"/>
-              <a:t>(верзија 2.7)</a:t>
-            </a:r>
+              <a:t>(верзија </a:t>
+            </a:r>
+            <a:r>
+              <a:rPr lang="sr-Latn-RS" dirty="0"/>
+              <a:t>3</a:t>
+            </a:r>
+            <a:r>
+              <a:rPr lang="sr-Cyrl-RS" dirty="0" smtClean="0"/>
+              <a:t>.</a:t>
+            </a:r>
+            <a:r>
+              <a:rPr lang="sr-Latn-RS" dirty="0" smtClean="0"/>
+              <a:t>8.2</a:t>
+            </a:r>
+            <a:r>
+              <a:rPr lang="sr-Cyrl-RS" dirty="0" smtClean="0"/>
+              <a:t>)</a:t>
+            </a:r>
+            <a:endParaRPr lang="sr-Cyrl-RS" dirty="0" smtClean="0"/>
           </a:p>
           <a:p>
             <a:r>
@@ -8559,7 +8580,7 @@
           <p:cNvPr id="2" name="Title 1">
             <a:extLst>
               <a:ext uri="{FF2B5EF4-FFF2-40B4-BE49-F238E27FC236}">
-                <a16:creationId xmlns="" xmlns:a16="http://schemas.microsoft.com/office/drawing/2014/main" id="{C40260F2-EC1D-3C4C-A3DE-0BF53F34F44A}"/>
+                <a16:creationId xmlns:a16="http://schemas.microsoft.com/office/drawing/2014/main" xmlns="" id="{C40260F2-EC1D-3C4C-A3DE-0BF53F34F44A}"/>
               </a:ext>
             </a:extLst>
           </p:cNvPr>
@@ -9182,9 +9203,187 @@
           <a:chExt cx="0" cy="0"/>
         </a:xfrm>
       </p:grpSpPr>
+      <p:sp>
+        <p:nvSpPr>
+          <p:cNvPr id="6" name="Content Placeholder 2"/>
+          <p:cNvSpPr>
+            <a:spLocks noGrp="1"/>
+          </p:cNvSpPr>
+          <p:nvPr>
+            <p:ph sz="half" idx="1"/>
+          </p:nvPr>
+        </p:nvSpPr>
+        <p:spPr>
+          <a:xfrm>
+            <a:off x="4684410" y="961084"/>
+            <a:ext cx="2516819" cy="500363"/>
+          </a:xfrm>
+        </p:spPr>
+        <p:txBody>
+          <a:bodyPr/>
+          <a:lstStyle/>
+          <a:p>
+            <a:pPr marL="0" indent="0">
+              <a:buNone/>
+            </a:pPr>
+            <a:r>
+              <a:rPr lang="sr-Cyrl-RS" dirty="0" smtClean="0">
+                <a:solidFill>
+                  <a:srgbClr val="C00000"/>
+                </a:solidFill>
+              </a:rPr>
+              <a:t>Употреба алата</a:t>
+            </a:r>
+          </a:p>
+          <a:p>
+            <a:endParaRPr lang="en-US" dirty="0">
+              <a:solidFill>
+                <a:srgbClr val="C00000"/>
+              </a:solidFill>
+            </a:endParaRPr>
+          </a:p>
+        </p:txBody>
+      </p:sp>
+      <p:sp>
+        <p:nvSpPr>
+          <p:cNvPr id="7" name="Content Placeholder 2"/>
+          <p:cNvSpPr>
+            <a:spLocks noGrp="1"/>
+          </p:cNvSpPr>
+          <p:nvPr>
+            <p:ph sz="half" idx="1"/>
+          </p:nvPr>
+        </p:nvSpPr>
+        <p:spPr>
+          <a:xfrm>
+            <a:off x="1136779" y="2644402"/>
+            <a:ext cx="10487608" cy="500363"/>
+          </a:xfrm>
+        </p:spPr>
+        <p:txBody>
+          <a:bodyPr>
+            <a:normAutofit/>
+          </a:bodyPr>
+          <a:lstStyle/>
+          <a:p>
+            <a:pPr marL="0" indent="0">
+              <a:buNone/>
+            </a:pPr>
+            <a:r>
+              <a:rPr lang="sr-Cyrl-RS" sz="2500" dirty="0" smtClean="0">
+                <a:solidFill>
+                  <a:schemeClr val="accent2"/>
+                </a:solidFill>
+              </a:rPr>
+              <a:t>Употребом опције </a:t>
+            </a:r>
+            <a:r>
+              <a:rPr lang="sr-Cyrl-RS" sz="2500" i="1" dirty="0" smtClean="0">
+                <a:solidFill>
+                  <a:schemeClr val="accent2"/>
+                </a:solidFill>
+              </a:rPr>
+              <a:t>--</a:t>
+            </a:r>
+            <a:r>
+              <a:rPr lang="sr-Latn-RS" sz="2500" i="1" dirty="0" smtClean="0">
+                <a:solidFill>
+                  <a:schemeClr val="accent2"/>
+                </a:solidFill>
+              </a:rPr>
+              <a:t>help</a:t>
+            </a:r>
+            <a:r>
+              <a:rPr lang="sr-Latn-RS" sz="2500" dirty="0" smtClean="0">
+                <a:solidFill>
+                  <a:schemeClr val="accent2"/>
+                </a:solidFill>
+              </a:rPr>
+              <a:t>,  </a:t>
+            </a:r>
+            <a:r>
+              <a:rPr lang="sr-Cyrl-RS" sz="2500" dirty="0" smtClean="0">
+                <a:solidFill>
+                  <a:schemeClr val="accent2"/>
+                </a:solidFill>
+              </a:rPr>
+              <a:t>исписује се упутство за коришћење алата </a:t>
+            </a:r>
+          </a:p>
+          <a:p>
+            <a:endParaRPr lang="en-US" sz="2500" dirty="0">
+              <a:solidFill>
+                <a:srgbClr val="C00000"/>
+              </a:solidFill>
+            </a:endParaRPr>
+          </a:p>
+        </p:txBody>
+      </p:sp>
+      <p:sp>
+        <p:nvSpPr>
+          <p:cNvPr id="10" name="TextBox 9"/>
+          <p:cNvSpPr txBox="1"/>
+          <p:nvPr/>
+        </p:nvSpPr>
+        <p:spPr>
+          <a:xfrm>
+            <a:off x="11058525" y="5686425"/>
+            <a:ext cx="914400" cy="369332"/>
+          </a:xfrm>
+          <a:prstGeom prst="rect">
+            <a:avLst/>
+          </a:prstGeom>
+          <a:noFill/>
+        </p:spPr>
+        <p:txBody>
+          <a:bodyPr wrap="square" rtlCol="0">
+            <a:spAutoFit/>
+          </a:bodyPr>
+          <a:lstStyle/>
+          <a:p>
+            <a:r>
+              <a:rPr lang="en-US" dirty="0" smtClean="0">
+                <a:solidFill>
+                  <a:schemeClr val="bg1">
+                    <a:lumMod val="75000"/>
+                  </a:schemeClr>
+                </a:solidFill>
+              </a:rPr>
+              <a:t>[</a:t>
+            </a:r>
+            <a:r>
+              <a:rPr lang="sr-Cyrl-RS" dirty="0" smtClean="0">
+                <a:solidFill>
+                  <a:schemeClr val="bg1">
+                    <a:lumMod val="75000"/>
+                  </a:schemeClr>
+                </a:solidFill>
+              </a:rPr>
+              <a:t>19</a:t>
+            </a:r>
+            <a:r>
+              <a:rPr lang="en-US" dirty="0" smtClean="0">
+                <a:solidFill>
+                  <a:schemeClr val="bg1">
+                    <a:lumMod val="75000"/>
+                  </a:schemeClr>
+                </a:solidFill>
+              </a:rPr>
+              <a:t>/34]</a:t>
+            </a:r>
+            <a:endParaRPr lang="en-US" dirty="0">
+              <a:solidFill>
+                <a:schemeClr val="bg1">
+                  <a:lumMod val="75000"/>
+                </a:schemeClr>
+              </a:solidFill>
+            </a:endParaRPr>
+          </a:p>
+        </p:txBody>
+      </p:sp>
       <p:pic>
         <p:nvPicPr>
-          <p:cNvPr id="5" name="Picture 4"/>
+          <p:cNvPr id="2" name="Picture 1"/>
           <p:cNvPicPr>
             <a:picLocks noChangeAspect="1"/>
           </p:cNvPicPr>
@@ -9198,133 +9397,17 @@
         </p:blipFill>
         <p:spPr>
           <a:xfrm>
-            <a:off x="261254" y="1529298"/>
-            <a:ext cx="11363133" cy="1070801"/>
+            <a:off x="918169" y="1581380"/>
+            <a:ext cx="10049299" cy="943088"/>
           </a:xfrm>
           <a:prstGeom prst="rect">
             <a:avLst/>
           </a:prstGeom>
         </p:spPr>
       </p:pic>
-      <p:sp>
-        <p:nvSpPr>
-          <p:cNvPr id="6" name="Content Placeholder 2"/>
-          <p:cNvSpPr>
-            <a:spLocks noGrp="1"/>
-          </p:cNvSpPr>
-          <p:nvPr>
-            <p:ph sz="half" idx="1"/>
-          </p:nvPr>
-        </p:nvSpPr>
-        <p:spPr>
-          <a:xfrm>
-            <a:off x="4684410" y="961084"/>
-            <a:ext cx="2516819" cy="500363"/>
-          </a:xfrm>
-        </p:spPr>
-        <p:txBody>
-          <a:bodyPr/>
-          <a:lstStyle/>
-          <a:p>
-            <a:pPr marL="0" indent="0">
-              <a:buNone/>
-            </a:pPr>
-            <a:r>
-              <a:rPr lang="sr-Cyrl-RS" dirty="0" smtClean="0">
-                <a:solidFill>
-                  <a:srgbClr val="C00000"/>
-                </a:solidFill>
-              </a:rPr>
-              <a:t>Употреба алата</a:t>
-            </a:r>
-          </a:p>
-          <a:p>
-            <a:endParaRPr lang="en-US" dirty="0">
-              <a:solidFill>
-                <a:srgbClr val="C00000"/>
-              </a:solidFill>
-            </a:endParaRPr>
-          </a:p>
-        </p:txBody>
-      </p:sp>
-      <p:sp>
-        <p:nvSpPr>
-          <p:cNvPr id="7" name="Content Placeholder 2"/>
-          <p:cNvSpPr>
-            <a:spLocks noGrp="1"/>
-          </p:cNvSpPr>
-          <p:nvPr>
-            <p:ph sz="half" idx="1"/>
-          </p:nvPr>
-        </p:nvSpPr>
-        <p:spPr>
-          <a:xfrm>
-            <a:off x="1136779" y="2644402"/>
-            <a:ext cx="10487608" cy="500363"/>
-          </a:xfrm>
-        </p:spPr>
-        <p:txBody>
-          <a:bodyPr>
-            <a:normAutofit/>
-          </a:bodyPr>
-          <a:lstStyle/>
-          <a:p>
-            <a:pPr marL="0" indent="0">
-              <a:buNone/>
-            </a:pPr>
-            <a:r>
-              <a:rPr lang="sr-Cyrl-RS" sz="2500" dirty="0" smtClean="0">
-                <a:solidFill>
-                  <a:schemeClr val="accent2"/>
-                </a:solidFill>
-              </a:rPr>
-              <a:t>Употребом опције </a:t>
-            </a:r>
-            <a:r>
-              <a:rPr lang="sr-Cyrl-RS" sz="2500" i="1" dirty="0" smtClean="0">
-                <a:solidFill>
-                  <a:schemeClr val="accent2"/>
-                </a:solidFill>
-              </a:rPr>
-              <a:t>--</a:t>
-            </a:r>
-            <a:r>
-              <a:rPr lang="sr-Latn-RS" sz="2500" i="1" dirty="0" smtClean="0">
-                <a:solidFill>
-                  <a:schemeClr val="accent2"/>
-                </a:solidFill>
-              </a:rPr>
-              <a:t>help</a:t>
-            </a:r>
-            <a:r>
-              <a:rPr lang="sr-Latn-RS" sz="2500" dirty="0" smtClean="0">
-                <a:solidFill>
-                  <a:schemeClr val="accent2"/>
-                </a:solidFill>
-              </a:rPr>
-              <a:t>,  </a:t>
-            </a:r>
-            <a:r>
-              <a:rPr lang="sr-Cyrl-RS" sz="2500" dirty="0" smtClean="0">
-                <a:solidFill>
-                  <a:schemeClr val="accent2"/>
-                </a:solidFill>
-              </a:rPr>
-              <a:t>исписује се упутство за коришћење алата </a:t>
-            </a:r>
-          </a:p>
-          <a:p>
-            <a:endParaRPr lang="en-US" sz="2500" dirty="0">
-              <a:solidFill>
-                <a:srgbClr val="C00000"/>
-              </a:solidFill>
-            </a:endParaRPr>
-          </a:p>
-        </p:txBody>
-      </p:sp>
       <p:pic>
         <p:nvPicPr>
-          <p:cNvPr id="9" name="Picture 8"/>
+          <p:cNvPr id="3" name="Picture 2"/>
           <p:cNvPicPr>
             <a:picLocks noChangeAspect="1"/>
           </p:cNvPicPr>
@@ -9338,76 +9421,14 @@
         </p:blipFill>
         <p:spPr>
           <a:xfrm>
-            <a:off x="1398327" y="3287866"/>
-            <a:ext cx="9193052" cy="2487783"/>
+            <a:off x="1288727" y="3264699"/>
+            <a:ext cx="9308182" cy="2529750"/>
           </a:xfrm>
           <a:prstGeom prst="rect">
             <a:avLst/>
           </a:prstGeom>
         </p:spPr>
       </p:pic>
-      <p:sp>
-        <p:nvSpPr>
-          <p:cNvPr id="10" name="TextBox 9"/>
-          <p:cNvSpPr txBox="1"/>
-          <p:nvPr/>
-        </p:nvSpPr>
-        <p:spPr>
-          <a:xfrm>
-            <a:off x="11058525" y="5686425"/>
-            <a:ext cx="914400" cy="369332"/>
-          </a:xfrm>
-          <a:prstGeom prst="rect">
-            <a:avLst/>
-          </a:prstGeom>
-          <a:noFill/>
-        </p:spPr>
-        <p:txBody>
-          <a:bodyPr wrap="square" rtlCol="0">
-            <a:spAutoFit/>
-          </a:bodyPr>
-          <a:lstStyle/>
-          <a:p>
-            <a:r>
-              <a:rPr lang="en-US" dirty="0" smtClean="0">
-                <a:solidFill>
-                  <a:schemeClr val="bg1">
-                    <a:lumMod val="75000"/>
-                  </a:schemeClr>
-                </a:solidFill>
-              </a:rPr>
-              <a:t>[</a:t>
-            </a:r>
-            <a:r>
-              <a:rPr lang="sr-Cyrl-RS" dirty="0" smtClean="0">
-                <a:solidFill>
-                  <a:schemeClr val="bg1">
-                    <a:lumMod val="75000"/>
-                  </a:schemeClr>
-                </a:solidFill>
-              </a:rPr>
-              <a:t>19</a:t>
-            </a:r>
-            <a:r>
-              <a:rPr lang="en-US" dirty="0" smtClean="0">
-                <a:solidFill>
-                  <a:schemeClr val="bg1">
-                    <a:lumMod val="75000"/>
-                  </a:schemeClr>
-                </a:solidFill>
-              </a:rPr>
-              <a:t>/34]</a:t>
-            </a:r>
-            <a:endParaRPr lang="en-US" dirty="0">
-              <a:solidFill>
-                <a:schemeClr val="bg1">
-                  <a:lumMod val="75000"/>
-                </a:schemeClr>
-              </a:solidFill>
-            </a:endParaRPr>
-          </a:p>
-        </p:txBody>
-      </p:sp>
     </p:spTree>
     <p:extLst>
       <p:ext uri="{BB962C8B-B14F-4D97-AF65-F5344CB8AC3E}">
@@ -9450,7 +9471,7 @@
         </p:nvSpPr>
         <p:spPr>
           <a:xfrm>
-            <a:off x="391886" y="849400"/>
+            <a:off x="155852" y="757034"/>
             <a:ext cx="10961914" cy="682668"/>
           </a:xfrm>
         </p:spPr>
@@ -9468,9 +9489,71 @@
           </a:p>
         </p:txBody>
       </p:sp>
+      <p:sp>
+        <p:nvSpPr>
+          <p:cNvPr id="6" name="TextBox 5"/>
+          <p:cNvSpPr txBox="1"/>
+          <p:nvPr/>
+        </p:nvSpPr>
+        <p:spPr>
+          <a:xfrm>
+            <a:off x="11058525" y="5686425"/>
+            <a:ext cx="914400" cy="369332"/>
+          </a:xfrm>
+          <a:prstGeom prst="rect">
+            <a:avLst/>
+          </a:prstGeom>
+          <a:noFill/>
+        </p:spPr>
+        <p:txBody>
+          <a:bodyPr wrap="square" rtlCol="0">
+            <a:spAutoFit/>
+          </a:bodyPr>
+          <a:lstStyle/>
+          <a:p>
+            <a:r>
+              <a:rPr lang="en-US" dirty="0" smtClean="0">
+                <a:solidFill>
+                  <a:schemeClr val="bg1">
+                    <a:lumMod val="75000"/>
+                  </a:schemeClr>
+                </a:solidFill>
+              </a:rPr>
+              <a:t>[</a:t>
+            </a:r>
+            <a:r>
+              <a:rPr lang="sr-Cyrl-RS" dirty="0" smtClean="0">
+                <a:solidFill>
+                  <a:schemeClr val="bg1">
+                    <a:lumMod val="75000"/>
+                  </a:schemeClr>
+                </a:solidFill>
+              </a:rPr>
+              <a:t>20</a:t>
+            </a:r>
+            <a:r>
+              <a:rPr lang="en-US" dirty="0" smtClean="0">
+                <a:solidFill>
+                  <a:schemeClr val="bg1">
+                    <a:lumMod val="75000"/>
+                  </a:schemeClr>
+                </a:solidFill>
+              </a:rPr>
+              <a:t>/34]</a:t>
+            </a:r>
+            <a:endParaRPr lang="en-US" dirty="0">
+              <a:solidFill>
+                <a:schemeClr val="bg1">
+                  <a:lumMod val="75000"/>
+                </a:schemeClr>
+              </a:solidFill>
+            </a:endParaRPr>
+          </a:p>
+        </p:txBody>
+      </p:sp>
       <p:pic>
         <p:nvPicPr>
-          <p:cNvPr id="5" name="Picture 4"/>
+          <p:cNvPr id="8" name="Picture 7"/>
           <p:cNvPicPr>
             <a:picLocks noChangeAspect="1"/>
           </p:cNvPicPr>
@@ -9484,81 +9567,14 @@
         </p:blipFill>
         <p:spPr>
           <a:xfrm>
-            <a:off x="2253440" y="1532068"/>
-            <a:ext cx="7238805" cy="4520004"/>
-          </a:xfrm>
-          <a:prstGeom prst="rect">
-            <a:avLst/>
-          </a:prstGeom>
-          <a:ln>
-            <a:solidFill>
-              <a:srgbClr val="C00000"/>
-            </a:solidFill>
-          </a:ln>
+            <a:off x="2733384" y="1545186"/>
+            <a:ext cx="5607461" cy="4585216"/>
+          </a:xfrm>
+          <a:prstGeom prst="rect">
+            <a:avLst/>
+          </a:prstGeom>
         </p:spPr>
       </p:pic>
-      <p:sp>
-        <p:nvSpPr>
-          <p:cNvPr id="6" name="TextBox 5"/>
-          <p:cNvSpPr txBox="1"/>
-          <p:nvPr/>
-        </p:nvSpPr>
-        <p:spPr>
-          <a:xfrm>
-            <a:off x="11058525" y="5686425"/>
-            <a:ext cx="914400" cy="369332"/>
-          </a:xfrm>
-          <a:prstGeom prst="rect">
-            <a:avLst/>
-          </a:prstGeom>
-          <a:noFill/>
-        </p:spPr>
-        <p:txBody>
-          <a:bodyPr wrap="square" rtlCol="0">
-            <a:spAutoFit/>
-          </a:bodyPr>
-          <a:lstStyle/>
-          <a:p>
-            <a:r>
-              <a:rPr lang="en-US" dirty="0" smtClean="0">
-                <a:solidFill>
-                  <a:schemeClr val="bg1">
-                    <a:lumMod val="75000"/>
-                  </a:schemeClr>
-                </a:solidFill>
-              </a:rPr>
-              <a:t>[</a:t>
-            </a:r>
-            <a:r>
-              <a:rPr lang="sr-Cyrl-RS" dirty="0" smtClean="0">
-                <a:solidFill>
-                  <a:schemeClr val="bg1">
-                    <a:lumMod val="75000"/>
-                  </a:schemeClr>
-                </a:solidFill>
-              </a:rPr>
-              <a:t>20</a:t>
-            </a:r>
-            <a:r>
-              <a:rPr lang="en-US" dirty="0" smtClean="0">
-                <a:solidFill>
-                  <a:schemeClr val="bg1">
-                    <a:lumMod val="75000"/>
-                  </a:schemeClr>
-                </a:solidFill>
-              </a:rPr>
-              <a:t>/34]</a:t>
-            </a:r>
-            <a:endParaRPr lang="en-US" dirty="0">
-              <a:solidFill>
-                <a:schemeClr val="bg1">
-                  <a:lumMod val="75000"/>
-                </a:schemeClr>
-              </a:solidFill>
-            </a:endParaRPr>
-          </a:p>
-        </p:txBody>
-      </p:sp>
     </p:spTree>
     <p:extLst>
       <p:ext uri="{BB962C8B-B14F-4D97-AF65-F5344CB8AC3E}">
@@ -10210,7 +10226,7 @@
         </p:spPr>
         <p:txBody>
           <a:bodyPr>
-            <a:normAutofit/>
+            <a:normAutofit fontScale="92500" lnSpcReduction="20000"/>
           </a:bodyPr>
           <a:lstStyle/>
           <a:p>
@@ -10266,6 +10282,22 @@
                 </a:solidFill>
               </a:rPr>
               <a:t> </a:t>
+            </a:r>
+            <a:endParaRPr lang="sr-Latn-RS" i="1" dirty="0" smtClean="0">
+              <a:solidFill>
+                <a:schemeClr val="accent2"/>
+              </a:solidFill>
+            </a:endParaRPr>
+          </a:p>
+          <a:p>
+            <a:pPr marL="457200" indent="-457200"/>
+            <a:r>
+              <a:rPr lang="sr-Latn-RS" i="1" dirty="0" smtClean="0">
+                <a:solidFill>
+                  <a:schemeClr val="accent2"/>
+                </a:solidFill>
+              </a:rPr>
+              <a:t>regExpUtils.py</a:t>
             </a:r>
             <a:endParaRPr lang="sr-Cyrl-RS" dirty="0"/>
           </a:p>
@@ -10422,7 +10454,7 @@
       </p:pic>
       <p:pic>
         <p:nvPicPr>
-          <p:cNvPr id="3" name="Picture 2"/>
+          <p:cNvPr id="4" name="Picture 3"/>
           <p:cNvPicPr>
             <a:picLocks noChangeAspect="1"/>
           </p:cNvPicPr>
@@ -10436,8 +10468,8 @@
         </p:blipFill>
         <p:spPr>
           <a:xfrm>
-            <a:off x="2266435" y="3466412"/>
-            <a:ext cx="6236676" cy="488892"/>
+            <a:off x="727423" y="4167776"/>
+            <a:ext cx="1164494" cy="308661"/>
           </a:xfrm>
           <a:prstGeom prst="rect">
             <a:avLst/>
@@ -10446,7 +10478,7 @@
       </p:pic>
       <p:pic>
         <p:nvPicPr>
-          <p:cNvPr id="4" name="Picture 3"/>
+          <p:cNvPr id="7" name="Picture 6"/>
           <p:cNvPicPr>
             <a:picLocks noChangeAspect="1"/>
           </p:cNvPicPr>
@@ -10460,8 +10492,8 @@
         </p:blipFill>
         <p:spPr>
           <a:xfrm>
-            <a:off x="727423" y="4167776"/>
-            <a:ext cx="1164494" cy="308661"/>
+            <a:off x="3329727" y="4118279"/>
+            <a:ext cx="1284484" cy="413397"/>
           </a:xfrm>
           <a:prstGeom prst="rect">
             <a:avLst/>
@@ -10470,7 +10502,7 @@
       </p:pic>
       <p:pic>
         <p:nvPicPr>
-          <p:cNvPr id="7" name="Picture 6"/>
+          <p:cNvPr id="8" name="Picture 7"/>
           <p:cNvPicPr>
             <a:picLocks noChangeAspect="1"/>
           </p:cNvPicPr>
@@ -10484,8 +10516,8 @@
         </p:blipFill>
         <p:spPr>
           <a:xfrm>
-            <a:off x="3329727" y="4118279"/>
-            <a:ext cx="1284484" cy="413397"/>
+            <a:off x="3265935" y="4827314"/>
+            <a:ext cx="1352430" cy="883219"/>
           </a:xfrm>
           <a:prstGeom prst="rect">
             <a:avLst/>
@@ -10494,7 +10526,7 @@
       </p:pic>
       <p:pic>
         <p:nvPicPr>
-          <p:cNvPr id="8" name="Picture 7"/>
+          <p:cNvPr id="10" name="Picture 9"/>
           <p:cNvPicPr>
             <a:picLocks noChangeAspect="1"/>
           </p:cNvPicPr>
@@ -10508,8 +10540,8 @@
         </p:blipFill>
         <p:spPr>
           <a:xfrm>
-            <a:off x="3265935" y="4827314"/>
-            <a:ext cx="1352430" cy="883219"/>
+            <a:off x="727423" y="4889758"/>
+            <a:ext cx="1602648" cy="305960"/>
           </a:xfrm>
           <a:prstGeom prst="rect">
             <a:avLst/>
@@ -10518,7 +10550,7 @@
       </p:pic>
       <p:pic>
         <p:nvPicPr>
-          <p:cNvPr id="10" name="Picture 9"/>
+          <p:cNvPr id="11" name="Picture 10"/>
           <p:cNvPicPr>
             <a:picLocks noChangeAspect="1"/>
           </p:cNvPicPr>
@@ -10532,30 +10564,6 @@
         </p:blipFill>
         <p:spPr>
           <a:xfrm>
-            <a:off x="727423" y="4889758"/>
-            <a:ext cx="1602648" cy="305960"/>
-          </a:xfrm>
-          <a:prstGeom prst="rect">
-            <a:avLst/>
-          </a:prstGeom>
-        </p:spPr>
-      </p:pic>
-      <p:pic>
-        <p:nvPicPr>
-          <p:cNvPr id="11" name="Picture 10"/>
-          <p:cNvPicPr>
-            <a:picLocks noChangeAspect="1"/>
-          </p:cNvPicPr>
-          <p:nvPr/>
-        </p:nvPicPr>
-        <p:blipFill>
-          <a:blip r:embed="rId8"/>
-          <a:stretch>
-            <a:fillRect/>
-          </a:stretch>
-        </p:blipFill>
-        <p:spPr>
-          <a:xfrm>
             <a:off x="5584519" y="4167776"/>
             <a:ext cx="1394318" cy="314405"/>
           </a:xfrm>
@@ -10573,7 +10581,7 @@
           <p:nvPr/>
         </p:nvPicPr>
         <p:blipFill>
-          <a:blip r:embed="rId9"/>
+          <a:blip r:embed="rId8"/>
           <a:stretch>
             <a:fillRect/>
           </a:stretch>
@@ -10770,6 +10778,30 @@
           </a:p>
         </p:txBody>
       </p:sp>
+      <p:pic>
+        <p:nvPicPr>
+          <p:cNvPr id="6" name="Picture 5"/>
+          <p:cNvPicPr>
+            <a:picLocks noChangeAspect="1"/>
+          </p:cNvPicPr>
+          <p:nvPr/>
+        </p:nvPicPr>
+        <p:blipFill>
+          <a:blip r:embed="rId9"/>
+          <a:stretch>
+            <a:fillRect/>
+          </a:stretch>
+        </p:blipFill>
+        <p:spPr>
+          <a:xfrm>
+            <a:off x="2117564" y="3528110"/>
+            <a:ext cx="6933909" cy="377949"/>
+          </a:xfrm>
+          <a:prstGeom prst="rect">
+            <a:avLst/>
+          </a:prstGeom>
+        </p:spPr>
+      </p:pic>
     </p:spTree>
     <p:extLst>
       <p:ext uri="{BB962C8B-B14F-4D97-AF65-F5344CB8AC3E}">
@@ -10862,7 +10894,7 @@
       </p:pic>
       <p:pic>
         <p:nvPicPr>
-          <p:cNvPr id="4" name="Picture 3"/>
+          <p:cNvPr id="7" name="Picture 6"/>
           <p:cNvPicPr>
             <a:picLocks noChangeAspect="1"/>
           </p:cNvPicPr>
@@ -10876,30 +10908,6 @@
         </p:blipFill>
         <p:spPr>
           <a:xfrm>
-            <a:off x="3889803" y="3291991"/>
-            <a:ext cx="3359494" cy="427304"/>
-          </a:xfrm>
-          <a:prstGeom prst="rect">
-            <a:avLst/>
-          </a:prstGeom>
-        </p:spPr>
-      </p:pic>
-      <p:pic>
-        <p:nvPicPr>
-          <p:cNvPr id="7" name="Picture 6"/>
-          <p:cNvPicPr>
-            <a:picLocks noChangeAspect="1"/>
-          </p:cNvPicPr>
-          <p:nvPr/>
-        </p:nvPicPr>
-        <p:blipFill>
-          <a:blip r:embed="rId4"/>
-          <a:stretch>
-            <a:fillRect/>
-          </a:stretch>
-        </p:blipFill>
-        <p:spPr>
-          <a:xfrm>
             <a:off x="6218002" y="3969312"/>
             <a:ext cx="4493152" cy="285099"/>
           </a:xfrm>
@@ -10917,7 +10925,7 @@
           <p:nvPr/>
         </p:nvPicPr>
         <p:blipFill>
-          <a:blip r:embed="rId5"/>
+          <a:blip r:embed="rId4"/>
           <a:stretch>
             <a:fillRect/>
           </a:stretch>
@@ -10981,7 +10989,7 @@
           <p:nvPr/>
         </p:nvPicPr>
         <p:blipFill>
-          <a:blip r:embed="rId6"/>
+          <a:blip r:embed="rId5"/>
           <a:stretch>
             <a:fillRect/>
           </a:stretch>
@@ -11005,7 +11013,7 @@
           <p:nvPr/>
         </p:nvPicPr>
         <p:blipFill>
-          <a:blip r:embed="rId7"/>
+          <a:blip r:embed="rId6"/>
           <a:stretch>
             <a:fillRect/>
           </a:stretch>
@@ -11122,6 +11130,30 @@
           </a:p>
         </p:txBody>
       </p:sp>
+      <p:pic>
+        <p:nvPicPr>
+          <p:cNvPr id="3" name="Picture 2"/>
+          <p:cNvPicPr>
+            <a:picLocks noChangeAspect="1"/>
+          </p:cNvPicPr>
+          <p:nvPr/>
+        </p:nvPicPr>
+        <p:blipFill>
+          <a:blip r:embed="rId7"/>
+          <a:stretch>
+            <a:fillRect/>
+          </a:stretch>
+        </p:blipFill>
+        <p:spPr>
+          <a:xfrm>
+            <a:off x="3694388" y="3256704"/>
+            <a:ext cx="4312006" cy="499285"/>
+          </a:xfrm>
+          <a:prstGeom prst="rect">
+            <a:avLst/>
+          </a:prstGeom>
+        </p:spPr>
+      </p:pic>
     </p:spTree>
     <p:extLst>
       <p:ext uri="{BB962C8B-B14F-4D97-AF65-F5344CB8AC3E}">
@@ -12428,7 +12460,7 @@
           <p:cNvPr id="2" name="Title 1">
             <a:extLst>
               <a:ext uri="{FF2B5EF4-FFF2-40B4-BE49-F238E27FC236}">
-                <a16:creationId xmlns="" xmlns:a16="http://schemas.microsoft.com/office/drawing/2014/main" id="{181C48EB-09C9-CA41-9B40-A6294E5F1C47}"/>
+                <a16:creationId xmlns:a16="http://schemas.microsoft.com/office/drawing/2014/main" xmlns="" id="{181C48EB-09C9-CA41-9B40-A6294E5F1C47}"/>
               </a:ext>
             </a:extLst>
           </p:cNvPr>
@@ -12459,7 +12491,7 @@
           <p:cNvPr id="3" name="Content Placeholder 2">
             <a:extLst>
               <a:ext uri="{FF2B5EF4-FFF2-40B4-BE49-F238E27FC236}">
-                <a16:creationId xmlns="" xmlns:a16="http://schemas.microsoft.com/office/drawing/2014/main" id="{5AFCD9C6-9970-A248-B6B7-7914EAA1E53A}"/>
+                <a16:creationId xmlns:a16="http://schemas.microsoft.com/office/drawing/2014/main" xmlns="" id="{5AFCD9C6-9970-A248-B6B7-7914EAA1E53A}"/>
               </a:ext>
             </a:extLst>
           </p:cNvPr>
@@ -13388,36 +13420,6 @@
           <a:chExt cx="0" cy="0"/>
         </a:xfrm>
       </p:grpSpPr>
-      <p:pic>
-        <p:nvPicPr>
-          <p:cNvPr id="6" name="Picture 5"/>
-          <p:cNvPicPr>
-            <a:picLocks noChangeAspect="1"/>
-          </p:cNvPicPr>
-          <p:nvPr/>
-        </p:nvPicPr>
-        <p:blipFill>
-          <a:blip r:embed="rId2">
-            <a:extLst>
-              <a:ext uri="{28A0092B-C50C-407E-A947-70E740481C1C}">
-                <a14:useLocalDpi xmlns:a14="http://schemas.microsoft.com/office/drawing/2010/main" val="0"/>
-              </a:ext>
-            </a:extLst>
-          </a:blip>
-          <a:stretch>
-            <a:fillRect/>
-          </a:stretch>
-        </p:blipFill>
-        <p:spPr>
-          <a:xfrm>
-            <a:off x="1711000" y="969413"/>
-            <a:ext cx="8095473" cy="4885029"/>
-          </a:xfrm>
-          <a:prstGeom prst="rect">
-            <a:avLst/>
-          </a:prstGeom>
-        </p:spPr>
-      </p:pic>
       <p:sp>
         <p:nvSpPr>
           <p:cNvPr id="7" name="TextBox 6"/>
@@ -13480,6 +13482,30 @@
           </a:p>
         </p:txBody>
       </p:sp>
+      <p:pic>
+        <p:nvPicPr>
+          <p:cNvPr id="2" name="Picture 1"/>
+          <p:cNvPicPr>
+            <a:picLocks noChangeAspect="1"/>
+          </p:cNvPicPr>
+          <p:nvPr/>
+        </p:nvPicPr>
+        <p:blipFill>
+          <a:blip r:embed="rId2"/>
+          <a:stretch>
+            <a:fillRect/>
+          </a:stretch>
+        </p:blipFill>
+        <p:spPr>
+          <a:xfrm>
+            <a:off x="1791380" y="975241"/>
+            <a:ext cx="8086725" cy="4895850"/>
+          </a:xfrm>
+          <a:prstGeom prst="rect">
+            <a:avLst/>
+          </a:prstGeom>
+        </p:spPr>
+      </p:pic>
     </p:spTree>
     <p:extLst>
       <p:ext uri="{BB962C8B-B14F-4D97-AF65-F5344CB8AC3E}">
@@ -14354,7 +14380,23 @@
           <a:p>
             <a:r>
               <a:rPr lang="sr-Cyrl-RS" dirty="0" smtClean="0"/>
-              <a:t>Сваки алат додаје свој код инструментализације</a:t>
+              <a:t>Сваки алат додаје свој </a:t>
+            </a:r>
+            <a:r>
+              <a:rPr lang="sr-Cyrl-RS" dirty="0" smtClean="0"/>
+              <a:t>к</a:t>
+            </a:r>
+            <a:r>
+              <a:rPr lang="en-US" sz="2200" dirty="0" smtClean="0"/>
+              <a:t>Ô</a:t>
+            </a:r>
+            <a:r>
+              <a:rPr lang="sr-Cyrl-RS" dirty="0" smtClean="0"/>
+              <a:t>д </a:t>
+            </a:r>
+            <a:r>
+              <a:rPr lang="sr-Cyrl-RS" dirty="0" smtClean="0"/>
+              <a:t>инструментализације</a:t>
             </a:r>
             <a:endParaRPr lang="sr-Latn-RS" dirty="0" smtClean="0"/>
           </a:p>
@@ -14495,15 +14537,7 @@
                   <a:srgbClr val="FF0000"/>
                 </a:solidFill>
               </a:rPr>
-              <a:t>==</a:t>
-            </a:r>
-            <a:r>
-              <a:rPr lang="en-US" dirty="0">
-                <a:solidFill>
-                  <a:srgbClr val="FF0000"/>
-                </a:solidFill>
-              </a:rPr>
-              <a:t>12345== </a:t>
+              <a:t>==12345== </a:t>
             </a:r>
             <a:r>
               <a:rPr lang="sr-Cyrl-RS" dirty="0" smtClean="0">
@@ -14825,15 +14859,7 @@
                   <a:srgbClr val="C00000"/>
                 </a:solidFill>
               </a:rPr>
-              <a:t> </a:t>
-            </a:r>
-            <a:r>
-              <a:rPr lang="en-US" sz="2400" dirty="0" smtClean="0">
-                <a:solidFill>
-                  <a:srgbClr val="C00000"/>
-                </a:solidFill>
-              </a:rPr>
-              <a:t>[</a:t>
+              <a:t> [</a:t>
             </a:r>
             <a:r>
               <a:rPr lang="sr-Latn-RS" sz="2400" dirty="0" smtClean="0">

</xml_diff>